<commit_message>
Updated start screen and loading images (buttons not yet implemented)
</commit_message>
<xml_diff>
--- a/Art/Logo/Logo.pptx
+++ b/Art/Logo/Logo.pptx
@@ -6,6 +6,8 @@
   </p:sldMasterIdLst>
   <p:sldIdLst>
     <p:sldId id="257" r:id="rId2"/>
+    <p:sldId id="259" r:id="rId3"/>
+    <p:sldId id="260" r:id="rId4"/>
   </p:sldIdLst>
   <p:sldSz cx="12192000" cy="6858000"/>
   <p:notesSz cx="6858000" cy="9144000"/>
@@ -104,6 +106,11 @@
       </a:defRPr>
     </a:lvl9pPr>
   </p:defaultTextStyle>
+  <p:extLst>
+    <p:ext uri="{EFAFB233-063F-42B5-8137-9DF3F51BA10A}">
+      <p15:sldGuideLst xmlns:p15="http://schemas.microsoft.com/office/powerpoint/2012/main"/>
+    </p:ext>
+  </p:extLst>
 </p:presentation>
 </file>
 
@@ -254,7 +261,7 @@
           <a:p>
             <a:fld id="{7EC8CFAE-0421-2A41-9031-AE8080A47584}" type="datetimeFigureOut">
               <a:rPr lang="en-US" smtClean="0"/>
-              <a:t>11/10/19</a:t>
+              <a:t>11/11/19</a:t>
             </a:fld>
             <a:endParaRPr lang="en-US"/>
           </a:p>
@@ -452,7 +459,7 @@
           <a:p>
             <a:fld id="{7EC8CFAE-0421-2A41-9031-AE8080A47584}" type="datetimeFigureOut">
               <a:rPr lang="en-US" smtClean="0"/>
-              <a:t>11/10/19</a:t>
+              <a:t>11/11/19</a:t>
             </a:fld>
             <a:endParaRPr lang="en-US"/>
           </a:p>
@@ -660,7 +667,7 @@
           <a:p>
             <a:fld id="{7EC8CFAE-0421-2A41-9031-AE8080A47584}" type="datetimeFigureOut">
               <a:rPr lang="en-US" smtClean="0"/>
-              <a:t>11/10/19</a:t>
+              <a:t>11/11/19</a:t>
             </a:fld>
             <a:endParaRPr lang="en-US"/>
           </a:p>
@@ -858,7 +865,7 @@
           <a:p>
             <a:fld id="{7EC8CFAE-0421-2A41-9031-AE8080A47584}" type="datetimeFigureOut">
               <a:rPr lang="en-US" smtClean="0"/>
-              <a:t>11/10/19</a:t>
+              <a:t>11/11/19</a:t>
             </a:fld>
             <a:endParaRPr lang="en-US"/>
           </a:p>
@@ -1133,7 +1140,7 @@
           <a:p>
             <a:fld id="{7EC8CFAE-0421-2A41-9031-AE8080A47584}" type="datetimeFigureOut">
               <a:rPr lang="en-US" smtClean="0"/>
-              <a:t>11/10/19</a:t>
+              <a:t>11/11/19</a:t>
             </a:fld>
             <a:endParaRPr lang="en-US"/>
           </a:p>
@@ -1398,7 +1405,7 @@
           <a:p>
             <a:fld id="{7EC8CFAE-0421-2A41-9031-AE8080A47584}" type="datetimeFigureOut">
               <a:rPr lang="en-US" smtClean="0"/>
-              <a:t>11/10/19</a:t>
+              <a:t>11/11/19</a:t>
             </a:fld>
             <a:endParaRPr lang="en-US"/>
           </a:p>
@@ -1810,7 +1817,7 @@
           <a:p>
             <a:fld id="{7EC8CFAE-0421-2A41-9031-AE8080A47584}" type="datetimeFigureOut">
               <a:rPr lang="en-US" smtClean="0"/>
-              <a:t>11/10/19</a:t>
+              <a:t>11/11/19</a:t>
             </a:fld>
             <a:endParaRPr lang="en-US"/>
           </a:p>
@@ -1951,7 +1958,7 @@
           <a:p>
             <a:fld id="{7EC8CFAE-0421-2A41-9031-AE8080A47584}" type="datetimeFigureOut">
               <a:rPr lang="en-US" smtClean="0"/>
-              <a:t>11/10/19</a:t>
+              <a:t>11/11/19</a:t>
             </a:fld>
             <a:endParaRPr lang="en-US"/>
           </a:p>
@@ -2064,7 +2071,7 @@
           <a:p>
             <a:fld id="{7EC8CFAE-0421-2A41-9031-AE8080A47584}" type="datetimeFigureOut">
               <a:rPr lang="en-US" smtClean="0"/>
-              <a:t>11/10/19</a:t>
+              <a:t>11/11/19</a:t>
             </a:fld>
             <a:endParaRPr lang="en-US"/>
           </a:p>
@@ -2375,7 +2382,7 @@
           <a:p>
             <a:fld id="{7EC8CFAE-0421-2A41-9031-AE8080A47584}" type="datetimeFigureOut">
               <a:rPr lang="en-US" smtClean="0"/>
-              <a:t>11/10/19</a:t>
+              <a:t>11/11/19</a:t>
             </a:fld>
             <a:endParaRPr lang="en-US"/>
           </a:p>
@@ -2663,7 +2670,7 @@
           <a:p>
             <a:fld id="{7EC8CFAE-0421-2A41-9031-AE8080A47584}" type="datetimeFigureOut">
               <a:rPr lang="en-US" smtClean="0"/>
-              <a:t>11/10/19</a:t>
+              <a:t>11/11/19</a:t>
             </a:fld>
             <a:endParaRPr lang="en-US"/>
           </a:p>
@@ -2904,7 +2911,7 @@
           <a:p>
             <a:fld id="{7EC8CFAE-0421-2A41-9031-AE8080A47584}" type="datetimeFigureOut">
               <a:rPr lang="en-US" smtClean="0"/>
-              <a:t>11/10/19</a:t>
+              <a:t>11/11/19</a:t>
             </a:fld>
             <a:endParaRPr lang="en-US"/>
           </a:p>
@@ -3321,395 +3328,1505 @@
           <a:chExt cx="0" cy="0"/>
         </a:xfrm>
       </p:grpSpPr>
-      <p:sp>
-        <p:nvSpPr>
-          <p:cNvPr id="4" name="Rectangle 3">
-            <a:extLst>
-              <a:ext uri="{FF2B5EF4-FFF2-40B4-BE49-F238E27FC236}">
-                <a16:creationId xmlns:a16="http://schemas.microsoft.com/office/drawing/2014/main" id="{4063AAD3-E10F-3547-8177-B73D21CF5894}"/>
-              </a:ext>
-            </a:extLst>
-          </p:cNvPr>
-          <p:cNvSpPr/>
+      <p:grpSp>
+        <p:nvGrpSpPr>
+          <p:cNvPr id="3" name="Group 2">
+            <a:extLst>
+              <a:ext uri="{FF2B5EF4-FFF2-40B4-BE49-F238E27FC236}">
+                <a16:creationId xmlns:a16="http://schemas.microsoft.com/office/drawing/2014/main" id="{F5C13F6B-AE2F-774F-BA76-702281B87044}"/>
+              </a:ext>
+            </a:extLst>
+          </p:cNvPr>
+          <p:cNvGrpSpPr/>
           <p:nvPr/>
-        </p:nvSpPr>
-        <p:spPr>
+        </p:nvGrpSpPr>
+        <p:grpSpPr>
           <a:xfrm>
             <a:off x="0" y="0"/>
             <a:ext cx="12192000" cy="6858000"/>
+            <a:chOff x="0" y="0"/>
+            <a:chExt cx="12192000" cy="6858000"/>
           </a:xfrm>
-          <a:prstGeom prst="rect">
-            <a:avLst/>
-          </a:prstGeom>
-          <a:solidFill>
-            <a:schemeClr val="tx1"/>
-          </a:solidFill>
-        </p:spPr>
-        <p:style>
-          <a:lnRef idx="2">
-            <a:schemeClr val="accent1">
-              <a:shade val="50000"/>
-            </a:schemeClr>
-          </a:lnRef>
-          <a:fillRef idx="1">
-            <a:schemeClr val="accent1"/>
-          </a:fillRef>
-          <a:effectRef idx="0">
-            <a:schemeClr val="accent1"/>
-          </a:effectRef>
-          <a:fontRef idx="minor">
-            <a:schemeClr val="lt1"/>
-          </a:fontRef>
-        </p:style>
-        <p:txBody>
-          <a:bodyPr rtlCol="0" anchor="ctr"/>
-          <a:lstStyle/>
-          <a:p>
-            <a:pPr algn="ctr"/>
-            <a:endParaRPr lang="en-US" dirty="0"/>
-          </a:p>
-        </p:txBody>
-      </p:sp>
-      <p:sp>
-        <p:nvSpPr>
-          <p:cNvPr id="9" name="Oval 8">
-            <a:extLst>
-              <a:ext uri="{FF2B5EF4-FFF2-40B4-BE49-F238E27FC236}">
-                <a16:creationId xmlns:a16="http://schemas.microsoft.com/office/drawing/2014/main" id="{65E9EB02-469B-D340-917A-E8E3AA6CA259}"/>
-              </a:ext>
-            </a:extLst>
-          </p:cNvPr>
-          <p:cNvSpPr/>
-          <p:nvPr/>
-        </p:nvSpPr>
-        <p:spPr>
-          <a:xfrm>
-            <a:off x="4000500" y="1173613"/>
-            <a:ext cx="2857500" cy="2873201"/>
-          </a:xfrm>
-          <a:prstGeom prst="ellipse">
-            <a:avLst/>
-          </a:prstGeom>
-          <a:solidFill>
-            <a:schemeClr val="accent4">
-              <a:lumMod val="75000"/>
-              <a:alpha val="49000"/>
-            </a:schemeClr>
-          </a:solidFill>
-          <a:ln>
+        </p:grpSpPr>
+        <p:sp>
+          <p:nvSpPr>
+            <p:cNvPr id="4" name="Rectangle 3">
+              <a:extLst>
+                <a:ext uri="{FF2B5EF4-FFF2-40B4-BE49-F238E27FC236}">
+                  <a16:creationId xmlns:a16="http://schemas.microsoft.com/office/drawing/2014/main" id="{4063AAD3-E10F-3547-8177-B73D21CF5894}"/>
+                </a:ext>
+              </a:extLst>
+            </p:cNvPr>
+            <p:cNvSpPr/>
+            <p:nvPr/>
+          </p:nvSpPr>
+          <p:spPr>
+            <a:xfrm>
+              <a:off x="0" y="0"/>
+              <a:ext cx="12192000" cy="6858000"/>
+            </a:xfrm>
+            <a:prstGeom prst="rect">
+              <a:avLst/>
+            </a:prstGeom>
+            <a:solidFill>
+              <a:schemeClr val="tx1"/>
+            </a:solidFill>
+          </p:spPr>
+          <p:style>
+            <a:lnRef idx="2">
+              <a:schemeClr val="accent1">
+                <a:shade val="50000"/>
+              </a:schemeClr>
+            </a:lnRef>
+            <a:fillRef idx="1">
+              <a:schemeClr val="accent1"/>
+            </a:fillRef>
+            <a:effectRef idx="0">
+              <a:schemeClr val="accent1"/>
+            </a:effectRef>
+            <a:fontRef idx="minor">
+              <a:schemeClr val="lt1"/>
+            </a:fontRef>
+          </p:style>
+          <p:txBody>
+            <a:bodyPr rtlCol="0" anchor="ctr"/>
+            <a:lstStyle/>
+            <a:p>
+              <a:pPr algn="ctr"/>
+              <a:endParaRPr lang="en-US" dirty="0"/>
+            </a:p>
+          </p:txBody>
+        </p:sp>
+        <p:sp>
+          <p:nvSpPr>
+            <p:cNvPr id="9" name="Oval 8">
+              <a:extLst>
+                <a:ext uri="{FF2B5EF4-FFF2-40B4-BE49-F238E27FC236}">
+                  <a16:creationId xmlns:a16="http://schemas.microsoft.com/office/drawing/2014/main" id="{65E9EB02-469B-D340-917A-E8E3AA6CA259}"/>
+                </a:ext>
+              </a:extLst>
+            </p:cNvPr>
+            <p:cNvSpPr/>
+            <p:nvPr/>
+          </p:nvSpPr>
+          <p:spPr>
+            <a:xfrm>
+              <a:off x="4000500" y="1173613"/>
+              <a:ext cx="2857500" cy="2873201"/>
+            </a:xfrm>
+            <a:prstGeom prst="ellipse">
+              <a:avLst/>
+            </a:prstGeom>
+            <a:solidFill>
+              <a:schemeClr val="accent4">
+                <a:lumMod val="75000"/>
+                <a:alpha val="49000"/>
+              </a:schemeClr>
+            </a:solidFill>
+            <a:ln>
+              <a:noFill/>
+            </a:ln>
+          </p:spPr>
+          <p:style>
+            <a:lnRef idx="2">
+              <a:schemeClr val="accent1">
+                <a:shade val="50000"/>
+              </a:schemeClr>
+            </a:lnRef>
+            <a:fillRef idx="1">
+              <a:schemeClr val="accent1"/>
+            </a:fillRef>
+            <a:effectRef idx="0">
+              <a:schemeClr val="accent1"/>
+            </a:effectRef>
+            <a:fontRef idx="minor">
+              <a:schemeClr val="lt1"/>
+            </a:fontRef>
+          </p:style>
+          <p:txBody>
+            <a:bodyPr rtlCol="0" anchor="ctr"/>
+            <a:lstStyle/>
+            <a:p>
+              <a:pPr algn="ctr"/>
+              <a:endParaRPr lang="en-US" dirty="0"/>
+            </a:p>
+          </p:txBody>
+        </p:sp>
+        <p:sp>
+          <p:nvSpPr>
+            <p:cNvPr id="10" name="Oval 9">
+              <a:extLst>
+                <a:ext uri="{FF2B5EF4-FFF2-40B4-BE49-F238E27FC236}">
+                  <a16:creationId xmlns:a16="http://schemas.microsoft.com/office/drawing/2014/main" id="{8BA33C70-0155-E84F-845F-ABB69789D9E8}"/>
+                </a:ext>
+              </a:extLst>
+            </p:cNvPr>
+            <p:cNvSpPr/>
+            <p:nvPr/>
+          </p:nvSpPr>
+          <p:spPr>
+            <a:xfrm>
+              <a:off x="4329113" y="1518414"/>
+              <a:ext cx="2214562" cy="2226731"/>
+            </a:xfrm>
+            <a:prstGeom prst="ellipse">
+              <a:avLst/>
+            </a:prstGeom>
+            <a:solidFill>
+              <a:schemeClr val="tx1"/>
+            </a:solidFill>
+            <a:ln>
+              <a:noFill/>
+            </a:ln>
+          </p:spPr>
+          <p:style>
+            <a:lnRef idx="2">
+              <a:schemeClr val="accent1">
+                <a:shade val="50000"/>
+              </a:schemeClr>
+            </a:lnRef>
+            <a:fillRef idx="1">
+              <a:schemeClr val="accent1"/>
+            </a:fillRef>
+            <a:effectRef idx="0">
+              <a:schemeClr val="accent1"/>
+            </a:effectRef>
+            <a:fontRef idx="minor">
+              <a:schemeClr val="lt1"/>
+            </a:fontRef>
+          </p:style>
+          <p:txBody>
+            <a:bodyPr rtlCol="0" anchor="ctr"/>
+            <a:lstStyle/>
+            <a:p>
+              <a:pPr algn="ctr"/>
+              <a:endParaRPr lang="en-US" dirty="0"/>
+            </a:p>
+          </p:txBody>
+        </p:sp>
+        <p:sp>
+          <p:nvSpPr>
+            <p:cNvPr id="11" name="Freeform 10">
+              <a:extLst>
+                <a:ext uri="{FF2B5EF4-FFF2-40B4-BE49-F238E27FC236}">
+                  <a16:creationId xmlns:a16="http://schemas.microsoft.com/office/drawing/2014/main" id="{D9474D3A-40BB-A44E-AA0D-88865263A5DD}"/>
+                </a:ext>
+              </a:extLst>
+            </p:cNvPr>
+            <p:cNvSpPr/>
+            <p:nvPr/>
+          </p:nvSpPr>
+          <p:spPr>
+            <a:xfrm>
+              <a:off x="6129112" y="3583315"/>
+              <a:ext cx="2086077" cy="2149692"/>
+            </a:xfrm>
+            <a:custGeom>
+              <a:avLst/>
+              <a:gdLst>
+                <a:gd name="connsiteX0" fmla="*/ 226 w 2086077"/>
+                <a:gd name="connsiteY0" fmla="*/ 688648 h 2149692"/>
+                <a:gd name="connsiteX1" fmla="*/ 614588 w 2086077"/>
+                <a:gd name="connsiteY1" fmla="*/ 17135 h 2149692"/>
+                <a:gd name="connsiteX2" fmla="*/ 828901 w 2086077"/>
+                <a:gd name="connsiteY2" fmla="*/ 288598 h 2149692"/>
+                <a:gd name="connsiteX3" fmla="*/ 1986188 w 2086077"/>
+                <a:gd name="connsiteY3" fmla="*/ 1231573 h 2149692"/>
+                <a:gd name="connsiteX4" fmla="*/ 1986188 w 2086077"/>
+                <a:gd name="connsiteY4" fmla="*/ 1988810 h 2149692"/>
+                <a:gd name="connsiteX5" fmla="*/ 1643288 w 2086077"/>
+                <a:gd name="connsiteY5" fmla="*/ 2031673 h 2149692"/>
+                <a:gd name="connsiteX6" fmla="*/ 557438 w 2086077"/>
+                <a:gd name="connsiteY6" fmla="*/ 674360 h 2149692"/>
+                <a:gd name="connsiteX7" fmla="*/ 226 w 2086077"/>
+                <a:gd name="connsiteY7" fmla="*/ 688648 h 2149692"/>
+              </a:gdLst>
+              <a:ahLst/>
+              <a:cxnLst>
+                <a:cxn ang="0">
+                  <a:pos x="connsiteX0" y="connsiteY0"/>
+                </a:cxn>
+                <a:cxn ang="0">
+                  <a:pos x="connsiteX1" y="connsiteY1"/>
+                </a:cxn>
+                <a:cxn ang="0">
+                  <a:pos x="connsiteX2" y="connsiteY2"/>
+                </a:cxn>
+                <a:cxn ang="0">
+                  <a:pos x="connsiteX3" y="connsiteY3"/>
+                </a:cxn>
+                <a:cxn ang="0">
+                  <a:pos x="connsiteX4" y="connsiteY4"/>
+                </a:cxn>
+                <a:cxn ang="0">
+                  <a:pos x="connsiteX5" y="connsiteY5"/>
+                </a:cxn>
+                <a:cxn ang="0">
+                  <a:pos x="connsiteX6" y="connsiteY6"/>
+                </a:cxn>
+                <a:cxn ang="0">
+                  <a:pos x="connsiteX7" y="connsiteY7"/>
+                </a:cxn>
+              </a:cxnLst>
+              <a:rect l="l" t="t" r="r" b="b"/>
+              <a:pathLst>
+                <a:path w="2086077" h="2149692">
+                  <a:moveTo>
+                    <a:pt x="226" y="688648"/>
+                  </a:moveTo>
+                  <a:cubicBezTo>
+                    <a:pt x="9751" y="579111"/>
+                    <a:pt x="476475" y="83810"/>
+                    <a:pt x="614588" y="17135"/>
+                  </a:cubicBezTo>
+                  <a:cubicBezTo>
+                    <a:pt x="752701" y="-49540"/>
+                    <a:pt x="600301" y="86192"/>
+                    <a:pt x="828901" y="288598"/>
+                  </a:cubicBezTo>
+                  <a:cubicBezTo>
+                    <a:pt x="1057501" y="491004"/>
+                    <a:pt x="1793307" y="948204"/>
+                    <a:pt x="1986188" y="1231573"/>
+                  </a:cubicBezTo>
+                  <a:cubicBezTo>
+                    <a:pt x="2179069" y="1514942"/>
+                    <a:pt x="2043338" y="1855460"/>
+                    <a:pt x="1986188" y="1988810"/>
+                  </a:cubicBezTo>
+                  <a:cubicBezTo>
+                    <a:pt x="1929038" y="2122160"/>
+                    <a:pt x="1881413" y="2250748"/>
+                    <a:pt x="1643288" y="2031673"/>
+                  </a:cubicBezTo>
+                  <a:cubicBezTo>
+                    <a:pt x="1405163" y="1812598"/>
+                    <a:pt x="831282" y="893435"/>
+                    <a:pt x="557438" y="674360"/>
+                  </a:cubicBezTo>
+                  <a:cubicBezTo>
+                    <a:pt x="283594" y="455285"/>
+                    <a:pt x="-9299" y="798185"/>
+                    <a:pt x="226" y="688648"/>
+                  </a:cubicBezTo>
+                  <a:close/>
+                </a:path>
+              </a:pathLst>
+            </a:custGeom>
+            <a:solidFill>
+              <a:schemeClr val="accent4">
+                <a:lumMod val="75000"/>
+                <a:alpha val="49000"/>
+              </a:schemeClr>
+            </a:solidFill>
+            <a:ln>
+              <a:noFill/>
+            </a:ln>
+          </p:spPr>
+          <p:style>
+            <a:lnRef idx="2">
+              <a:schemeClr val="accent1">
+                <a:shade val="50000"/>
+              </a:schemeClr>
+            </a:lnRef>
+            <a:fillRef idx="1">
+              <a:schemeClr val="accent1"/>
+            </a:fillRef>
+            <a:effectRef idx="0">
+              <a:schemeClr val="accent1"/>
+            </a:effectRef>
+            <a:fontRef idx="minor">
+              <a:schemeClr val="lt1"/>
+            </a:fontRef>
+          </p:style>
+          <p:txBody>
+            <a:bodyPr rtlCol="0" anchor="ctr"/>
+            <a:lstStyle/>
+            <a:p>
+              <a:pPr algn="ctr"/>
+              <a:endParaRPr lang="en-US" dirty="0"/>
+            </a:p>
+          </p:txBody>
+        </p:sp>
+        <p:sp>
+          <p:nvSpPr>
+            <p:cNvPr id="12" name="TextBox 11">
+              <a:extLst>
+                <a:ext uri="{FF2B5EF4-FFF2-40B4-BE49-F238E27FC236}">
+                  <a16:creationId xmlns:a16="http://schemas.microsoft.com/office/drawing/2014/main" id="{807E4626-E821-7746-9F3A-1C3358DDC491}"/>
+                </a:ext>
+              </a:extLst>
+            </p:cNvPr>
+            <p:cNvSpPr txBox="1"/>
+            <p:nvPr/>
+          </p:nvSpPr>
+          <p:spPr>
+            <a:xfrm>
+              <a:off x="0" y="1735841"/>
+              <a:ext cx="12192000" cy="2862322"/>
+            </a:xfrm>
+            <a:prstGeom prst="rect">
+              <a:avLst/>
+            </a:prstGeom>
             <a:noFill/>
-          </a:ln>
-        </p:spPr>
-        <p:style>
-          <a:lnRef idx="2">
-            <a:schemeClr val="accent1">
-              <a:shade val="50000"/>
-            </a:schemeClr>
-          </a:lnRef>
-          <a:fillRef idx="1">
-            <a:schemeClr val="accent1"/>
-          </a:fillRef>
-          <a:effectRef idx="0">
-            <a:schemeClr val="accent1"/>
-          </a:effectRef>
-          <a:fontRef idx="minor">
-            <a:schemeClr val="lt1"/>
-          </a:fontRef>
-        </p:style>
-        <p:txBody>
-          <a:bodyPr rtlCol="0" anchor="ctr"/>
-          <a:lstStyle/>
-          <a:p>
-            <a:pPr algn="ctr"/>
-            <a:endParaRPr lang="en-US" dirty="0"/>
-          </a:p>
-        </p:txBody>
-      </p:sp>
-      <p:sp>
-        <p:nvSpPr>
-          <p:cNvPr id="10" name="Oval 9">
-            <a:extLst>
-              <a:ext uri="{FF2B5EF4-FFF2-40B4-BE49-F238E27FC236}">
-                <a16:creationId xmlns:a16="http://schemas.microsoft.com/office/drawing/2014/main" id="{8BA33C70-0155-E84F-845F-ABB69789D9E8}"/>
-              </a:ext>
-            </a:extLst>
-          </p:cNvPr>
-          <p:cNvSpPr/>
-          <p:nvPr/>
-        </p:nvSpPr>
-        <p:spPr>
-          <a:xfrm>
-            <a:off x="4329113" y="1518414"/>
-            <a:ext cx="2214562" cy="2226731"/>
-          </a:xfrm>
-          <a:prstGeom prst="ellipse">
-            <a:avLst/>
-          </a:prstGeom>
-          <a:solidFill>
-            <a:schemeClr val="tx1"/>
-          </a:solidFill>
-          <a:ln>
-            <a:noFill/>
-          </a:ln>
-        </p:spPr>
-        <p:style>
-          <a:lnRef idx="2">
-            <a:schemeClr val="accent1">
-              <a:shade val="50000"/>
-            </a:schemeClr>
-          </a:lnRef>
-          <a:fillRef idx="1">
-            <a:schemeClr val="accent1"/>
-          </a:fillRef>
-          <a:effectRef idx="0">
-            <a:schemeClr val="accent1"/>
-          </a:effectRef>
-          <a:fontRef idx="minor">
-            <a:schemeClr val="lt1"/>
-          </a:fontRef>
-        </p:style>
-        <p:txBody>
-          <a:bodyPr rtlCol="0" anchor="ctr"/>
-          <a:lstStyle/>
-          <a:p>
-            <a:pPr algn="ctr"/>
-            <a:endParaRPr lang="en-US" dirty="0"/>
-          </a:p>
-        </p:txBody>
-      </p:sp>
-      <p:sp>
-        <p:nvSpPr>
-          <p:cNvPr id="11" name="Freeform 10">
-            <a:extLst>
-              <a:ext uri="{FF2B5EF4-FFF2-40B4-BE49-F238E27FC236}">
-                <a16:creationId xmlns:a16="http://schemas.microsoft.com/office/drawing/2014/main" id="{D9474D3A-40BB-A44E-AA0D-88865263A5DD}"/>
-              </a:ext>
-            </a:extLst>
-          </p:cNvPr>
-          <p:cNvSpPr/>
-          <p:nvPr/>
-        </p:nvSpPr>
-        <p:spPr>
-          <a:xfrm>
-            <a:off x="6129112" y="3583315"/>
-            <a:ext cx="2086077" cy="2149692"/>
-          </a:xfrm>
-          <a:custGeom>
-            <a:avLst/>
-            <a:gdLst>
-              <a:gd name="connsiteX0" fmla="*/ 226 w 2086077"/>
-              <a:gd name="connsiteY0" fmla="*/ 688648 h 2149692"/>
-              <a:gd name="connsiteX1" fmla="*/ 614588 w 2086077"/>
-              <a:gd name="connsiteY1" fmla="*/ 17135 h 2149692"/>
-              <a:gd name="connsiteX2" fmla="*/ 828901 w 2086077"/>
-              <a:gd name="connsiteY2" fmla="*/ 288598 h 2149692"/>
-              <a:gd name="connsiteX3" fmla="*/ 1986188 w 2086077"/>
-              <a:gd name="connsiteY3" fmla="*/ 1231573 h 2149692"/>
-              <a:gd name="connsiteX4" fmla="*/ 1986188 w 2086077"/>
-              <a:gd name="connsiteY4" fmla="*/ 1988810 h 2149692"/>
-              <a:gd name="connsiteX5" fmla="*/ 1643288 w 2086077"/>
-              <a:gd name="connsiteY5" fmla="*/ 2031673 h 2149692"/>
-              <a:gd name="connsiteX6" fmla="*/ 557438 w 2086077"/>
-              <a:gd name="connsiteY6" fmla="*/ 674360 h 2149692"/>
-              <a:gd name="connsiteX7" fmla="*/ 226 w 2086077"/>
-              <a:gd name="connsiteY7" fmla="*/ 688648 h 2149692"/>
-            </a:gdLst>
-            <a:ahLst/>
-            <a:cxnLst>
-              <a:cxn ang="0">
-                <a:pos x="connsiteX0" y="connsiteY0"/>
-              </a:cxn>
-              <a:cxn ang="0">
-                <a:pos x="connsiteX1" y="connsiteY1"/>
-              </a:cxn>
-              <a:cxn ang="0">
-                <a:pos x="connsiteX2" y="connsiteY2"/>
-              </a:cxn>
-              <a:cxn ang="0">
-                <a:pos x="connsiteX3" y="connsiteY3"/>
-              </a:cxn>
-              <a:cxn ang="0">
-                <a:pos x="connsiteX4" y="connsiteY4"/>
-              </a:cxn>
-              <a:cxn ang="0">
-                <a:pos x="connsiteX5" y="connsiteY5"/>
-              </a:cxn>
-              <a:cxn ang="0">
-                <a:pos x="connsiteX6" y="connsiteY6"/>
-              </a:cxn>
-              <a:cxn ang="0">
-                <a:pos x="connsiteX7" y="connsiteY7"/>
-              </a:cxn>
-            </a:cxnLst>
-            <a:rect l="l" t="t" r="r" b="b"/>
-            <a:pathLst>
-              <a:path w="2086077" h="2149692">
-                <a:moveTo>
-                  <a:pt x="226" y="688648"/>
-                </a:moveTo>
-                <a:cubicBezTo>
-                  <a:pt x="9751" y="579111"/>
-                  <a:pt x="476475" y="83810"/>
-                  <a:pt x="614588" y="17135"/>
-                </a:cubicBezTo>
-                <a:cubicBezTo>
-                  <a:pt x="752701" y="-49540"/>
-                  <a:pt x="600301" y="86192"/>
-                  <a:pt x="828901" y="288598"/>
-                </a:cubicBezTo>
-                <a:cubicBezTo>
-                  <a:pt x="1057501" y="491004"/>
-                  <a:pt x="1793307" y="948204"/>
-                  <a:pt x="1986188" y="1231573"/>
-                </a:cubicBezTo>
-                <a:cubicBezTo>
-                  <a:pt x="2179069" y="1514942"/>
-                  <a:pt x="2043338" y="1855460"/>
-                  <a:pt x="1986188" y="1988810"/>
-                </a:cubicBezTo>
-                <a:cubicBezTo>
-                  <a:pt x="1929038" y="2122160"/>
-                  <a:pt x="1881413" y="2250748"/>
-                  <a:pt x="1643288" y="2031673"/>
-                </a:cubicBezTo>
-                <a:cubicBezTo>
-                  <a:pt x="1405163" y="1812598"/>
-                  <a:pt x="831282" y="893435"/>
-                  <a:pt x="557438" y="674360"/>
-                </a:cubicBezTo>
-                <a:cubicBezTo>
-                  <a:pt x="283594" y="455285"/>
-                  <a:pt x="-9299" y="798185"/>
-                  <a:pt x="226" y="688648"/>
-                </a:cubicBezTo>
-                <a:close/>
-              </a:path>
-            </a:pathLst>
-          </a:custGeom>
-          <a:solidFill>
-            <a:schemeClr val="accent4">
-              <a:lumMod val="75000"/>
-              <a:alpha val="49000"/>
-            </a:schemeClr>
-          </a:solidFill>
-          <a:ln>
-            <a:noFill/>
-          </a:ln>
-        </p:spPr>
-        <p:style>
-          <a:lnRef idx="2">
-            <a:schemeClr val="accent1">
-              <a:shade val="50000"/>
-            </a:schemeClr>
-          </a:lnRef>
-          <a:fillRef idx="1">
-            <a:schemeClr val="accent1"/>
-          </a:fillRef>
-          <a:effectRef idx="0">
-            <a:schemeClr val="accent1"/>
-          </a:effectRef>
-          <a:fontRef idx="minor">
-            <a:schemeClr val="lt1"/>
-          </a:fontRef>
-        </p:style>
-        <p:txBody>
-          <a:bodyPr rtlCol="0" anchor="ctr"/>
-          <a:lstStyle/>
-          <a:p>
-            <a:pPr algn="ctr"/>
-            <a:endParaRPr lang="en-US" dirty="0"/>
-          </a:p>
-        </p:txBody>
-      </p:sp>
-      <p:sp>
-        <p:nvSpPr>
-          <p:cNvPr id="12" name="TextBox 11">
-            <a:extLst>
-              <a:ext uri="{FF2B5EF4-FFF2-40B4-BE49-F238E27FC236}">
-                <a16:creationId xmlns:a16="http://schemas.microsoft.com/office/drawing/2014/main" id="{807E4626-E821-7746-9F3A-1C3358DDC491}"/>
-              </a:ext>
-            </a:extLst>
-          </p:cNvPr>
-          <p:cNvSpPr txBox="1"/>
-          <p:nvPr/>
-        </p:nvSpPr>
-        <p:spPr>
-          <a:xfrm>
-            <a:off x="0" y="1735841"/>
-            <a:ext cx="12192000" cy="2862322"/>
-          </a:xfrm>
-          <a:prstGeom prst="rect">
-            <a:avLst/>
-          </a:prstGeom>
-          <a:noFill/>
-        </p:spPr>
-        <p:txBody>
-          <a:bodyPr wrap="square" rtlCol="0">
-            <a:spAutoFit/>
-          </a:bodyPr>
-          <a:lstStyle/>
-          <a:p>
-            <a:pPr algn="ctr"/>
-            <a:r>
-              <a:rPr lang="en-US" sz="17500" b="1" spc="200" dirty="0" err="1">
-                <a:solidFill>
-                  <a:srgbClr val="C00000"/>
-                </a:solidFill>
-                <a:effectLst>
-                  <a:outerShdw blurRad="50800" dist="38100" dir="18900000" sx="101000" sy="101000" algn="bl" rotWithShape="0">
-                    <a:prstClr val="black"/>
-                  </a:outerShdw>
-                </a:effectLst>
-                <a:latin typeface="Bahiana" pitchFamily="2" charset="77"/>
-              </a:rPr>
-              <a:t>Merder</a:t>
-            </a:r>
-            <a:r>
-              <a:rPr lang="en-US" sz="17500" b="1" spc="200" dirty="0">
-                <a:solidFill>
-                  <a:srgbClr val="C00000"/>
-                </a:solidFill>
-                <a:effectLst>
-                  <a:outerShdw blurRad="50800" dist="38100" dir="18900000" sx="101000" sy="101000" algn="bl" rotWithShape="0">
-                    <a:prstClr val="black"/>
-                  </a:outerShdw>
-                </a:effectLst>
-                <a:latin typeface="Bahiana" pitchFamily="2" charset="77"/>
-              </a:rPr>
-              <a:t> </a:t>
-            </a:r>
-            <a:r>
-              <a:rPr lang="en-US" sz="17500" b="1" spc="200" dirty="0" err="1">
-                <a:solidFill>
-                  <a:srgbClr val="C00000"/>
-                </a:solidFill>
-                <a:effectLst>
-                  <a:outerShdw blurRad="50800" dist="38100" dir="18900000" sx="101000" sy="101000" algn="bl" rotWithShape="0">
-                    <a:prstClr val="black"/>
-                  </a:outerShdw>
-                </a:effectLst>
-                <a:latin typeface="Bahiana" pitchFamily="2" charset="77"/>
-              </a:rPr>
-              <a:t>Misstery</a:t>
-            </a:r>
-            <a:endParaRPr lang="en-US" sz="17500" b="1" spc="200" dirty="0">
-              <a:solidFill>
-                <a:srgbClr val="C00000"/>
-              </a:solidFill>
-              <a:effectLst>
-                <a:outerShdw blurRad="50800" dist="38100" dir="18900000" sx="101000" sy="101000" algn="bl" rotWithShape="0">
-                  <a:prstClr val="black"/>
-                </a:outerShdw>
-              </a:effectLst>
-              <a:latin typeface="Bahiana" pitchFamily="2" charset="77"/>
-            </a:endParaRPr>
-          </a:p>
-        </p:txBody>
-      </p:sp>
+          </p:spPr>
+          <p:txBody>
+            <a:bodyPr wrap="square" rtlCol="0">
+              <a:spAutoFit/>
+            </a:bodyPr>
+            <a:lstStyle/>
+            <a:p>
+              <a:pPr algn="ctr"/>
+              <a:r>
+                <a:rPr lang="en-US" sz="17500" b="1" spc="200" dirty="0">
+                  <a:solidFill>
+                    <a:srgbClr val="C00000"/>
+                  </a:solidFill>
+                  <a:effectLst>
+                    <a:outerShdw blurRad="50800" dist="38100" dir="18900000" sx="101000" sy="101000" algn="bl" rotWithShape="0">
+                      <a:prstClr val="black"/>
+                    </a:outerShdw>
+                  </a:effectLst>
+                  <a:latin typeface="Bahiana" pitchFamily="2" charset="77"/>
+                </a:rPr>
+                <a:t>Merder Misstery</a:t>
+              </a:r>
+            </a:p>
+          </p:txBody>
+        </p:sp>
+      </p:grpSp>
     </p:spTree>
     <p:extLst>
       <p:ext uri="{BB962C8B-B14F-4D97-AF65-F5344CB8AC3E}">
         <p14:creationId xmlns:p14="http://schemas.microsoft.com/office/powerpoint/2010/main" val="218626717"/>
+      </p:ext>
+    </p:extLst>
+  </p:cSld>
+  <p:clrMapOvr>
+    <a:masterClrMapping/>
+  </p:clrMapOvr>
+</p:sld>
+</file>
+
+<file path=ppt/slides/slide2.xml><?xml version="1.0" encoding="utf-8"?>
+<p:sld xmlns:a="http://schemas.openxmlformats.org/drawingml/2006/main" xmlns:r="http://schemas.openxmlformats.org/officeDocument/2006/relationships" xmlns:p="http://schemas.openxmlformats.org/presentationml/2006/main">
+  <p:cSld>
+    <p:spTree>
+      <p:nvGrpSpPr>
+        <p:cNvPr id="1" name=""/>
+        <p:cNvGrpSpPr/>
+        <p:nvPr/>
+      </p:nvGrpSpPr>
+      <p:grpSpPr>
+        <a:xfrm>
+          <a:off x="0" y="0"/>
+          <a:ext cx="0" cy="0"/>
+          <a:chOff x="0" y="0"/>
+          <a:chExt cx="0" cy="0"/>
+        </a:xfrm>
+      </p:grpSpPr>
+      <p:grpSp>
+        <p:nvGrpSpPr>
+          <p:cNvPr id="7" name="Group 6">
+            <a:extLst>
+              <a:ext uri="{FF2B5EF4-FFF2-40B4-BE49-F238E27FC236}">
+                <a16:creationId xmlns:a16="http://schemas.microsoft.com/office/drawing/2014/main" id="{060CB379-5196-3A4B-8FC6-C63599EB77F4}"/>
+              </a:ext>
+            </a:extLst>
+          </p:cNvPr>
+          <p:cNvGrpSpPr/>
+          <p:nvPr/>
+        </p:nvGrpSpPr>
+        <p:grpSpPr>
+          <a:xfrm>
+            <a:off x="0" y="0"/>
+            <a:ext cx="12192000" cy="6858000"/>
+            <a:chOff x="0" y="0"/>
+            <a:chExt cx="12192000" cy="6858000"/>
+          </a:xfrm>
+        </p:grpSpPr>
+        <p:grpSp>
+          <p:nvGrpSpPr>
+            <p:cNvPr id="5" name="Group 4">
+              <a:extLst>
+                <a:ext uri="{FF2B5EF4-FFF2-40B4-BE49-F238E27FC236}">
+                  <a16:creationId xmlns:a16="http://schemas.microsoft.com/office/drawing/2014/main" id="{B9C1D3F5-F710-F145-BE76-6A55BB430B42}"/>
+                </a:ext>
+              </a:extLst>
+            </p:cNvPr>
+            <p:cNvGrpSpPr/>
+            <p:nvPr/>
+          </p:nvGrpSpPr>
+          <p:grpSpPr>
+            <a:xfrm>
+              <a:off x="0" y="0"/>
+              <a:ext cx="12192000" cy="6858000"/>
+              <a:chOff x="0" y="0"/>
+              <a:chExt cx="12192000" cy="6858000"/>
+            </a:xfrm>
+          </p:grpSpPr>
+          <p:grpSp>
+            <p:nvGrpSpPr>
+              <p:cNvPr id="3" name="Group 2">
+                <a:extLst>
+                  <a:ext uri="{FF2B5EF4-FFF2-40B4-BE49-F238E27FC236}">
+                    <a16:creationId xmlns:a16="http://schemas.microsoft.com/office/drawing/2014/main" id="{F5C13F6B-AE2F-774F-BA76-702281B87044}"/>
+                  </a:ext>
+                </a:extLst>
+              </p:cNvPr>
+              <p:cNvGrpSpPr/>
+              <p:nvPr/>
+            </p:nvGrpSpPr>
+            <p:grpSpPr>
+              <a:xfrm>
+                <a:off x="0" y="0"/>
+                <a:ext cx="12192000" cy="6858000"/>
+                <a:chOff x="0" y="0"/>
+                <a:chExt cx="12192000" cy="6858000"/>
+              </a:xfrm>
+            </p:grpSpPr>
+            <p:sp>
+              <p:nvSpPr>
+                <p:cNvPr id="4" name="Rectangle 3">
+                  <a:extLst>
+                    <a:ext uri="{FF2B5EF4-FFF2-40B4-BE49-F238E27FC236}">
+                      <a16:creationId xmlns:a16="http://schemas.microsoft.com/office/drawing/2014/main" id="{4063AAD3-E10F-3547-8177-B73D21CF5894}"/>
+                    </a:ext>
+                  </a:extLst>
+                </p:cNvPr>
+                <p:cNvSpPr/>
+                <p:nvPr/>
+              </p:nvSpPr>
+              <p:spPr>
+                <a:xfrm>
+                  <a:off x="0" y="0"/>
+                  <a:ext cx="12192000" cy="6858000"/>
+                </a:xfrm>
+                <a:prstGeom prst="rect">
+                  <a:avLst/>
+                </a:prstGeom>
+                <a:solidFill>
+                  <a:schemeClr val="tx1"/>
+                </a:solidFill>
+              </p:spPr>
+              <p:style>
+                <a:lnRef idx="2">
+                  <a:schemeClr val="accent1">
+                    <a:shade val="50000"/>
+                  </a:schemeClr>
+                </a:lnRef>
+                <a:fillRef idx="1">
+                  <a:schemeClr val="accent1"/>
+                </a:fillRef>
+                <a:effectRef idx="0">
+                  <a:schemeClr val="accent1"/>
+                </a:effectRef>
+                <a:fontRef idx="minor">
+                  <a:schemeClr val="lt1"/>
+                </a:fontRef>
+              </p:style>
+              <p:txBody>
+                <a:bodyPr rtlCol="0" anchor="ctr"/>
+                <a:lstStyle/>
+                <a:p>
+                  <a:pPr algn="ctr"/>
+                  <a:endParaRPr lang="en-US" dirty="0"/>
+                </a:p>
+              </p:txBody>
+            </p:sp>
+            <p:sp>
+              <p:nvSpPr>
+                <p:cNvPr id="9" name="Oval 8">
+                  <a:extLst>
+                    <a:ext uri="{FF2B5EF4-FFF2-40B4-BE49-F238E27FC236}">
+                      <a16:creationId xmlns:a16="http://schemas.microsoft.com/office/drawing/2014/main" id="{65E9EB02-469B-D340-917A-E8E3AA6CA259}"/>
+                    </a:ext>
+                  </a:extLst>
+                </p:cNvPr>
+                <p:cNvSpPr/>
+                <p:nvPr/>
+              </p:nvSpPr>
+              <p:spPr>
+                <a:xfrm>
+                  <a:off x="4000500" y="440835"/>
+                  <a:ext cx="2857500" cy="2873201"/>
+                </a:xfrm>
+                <a:prstGeom prst="ellipse">
+                  <a:avLst/>
+                </a:prstGeom>
+                <a:solidFill>
+                  <a:schemeClr val="accent4">
+                    <a:lumMod val="75000"/>
+                    <a:alpha val="49000"/>
+                  </a:schemeClr>
+                </a:solidFill>
+                <a:ln>
+                  <a:noFill/>
+                </a:ln>
+              </p:spPr>
+              <p:style>
+                <a:lnRef idx="2">
+                  <a:schemeClr val="accent1">
+                    <a:shade val="50000"/>
+                  </a:schemeClr>
+                </a:lnRef>
+                <a:fillRef idx="1">
+                  <a:schemeClr val="accent1"/>
+                </a:fillRef>
+                <a:effectRef idx="0">
+                  <a:schemeClr val="accent1"/>
+                </a:effectRef>
+                <a:fontRef idx="minor">
+                  <a:schemeClr val="lt1"/>
+                </a:fontRef>
+              </p:style>
+              <p:txBody>
+                <a:bodyPr rtlCol="0" anchor="ctr"/>
+                <a:lstStyle/>
+                <a:p>
+                  <a:pPr algn="ctr"/>
+                  <a:endParaRPr lang="en-US" dirty="0"/>
+                </a:p>
+              </p:txBody>
+            </p:sp>
+            <p:sp>
+              <p:nvSpPr>
+                <p:cNvPr id="10" name="Oval 9">
+                  <a:extLst>
+                    <a:ext uri="{FF2B5EF4-FFF2-40B4-BE49-F238E27FC236}">
+                      <a16:creationId xmlns:a16="http://schemas.microsoft.com/office/drawing/2014/main" id="{8BA33C70-0155-E84F-845F-ABB69789D9E8}"/>
+                    </a:ext>
+                  </a:extLst>
+                </p:cNvPr>
+                <p:cNvSpPr/>
+                <p:nvPr/>
+              </p:nvSpPr>
+              <p:spPr>
+                <a:xfrm>
+                  <a:off x="4329113" y="785636"/>
+                  <a:ext cx="2214562" cy="2226731"/>
+                </a:xfrm>
+                <a:prstGeom prst="ellipse">
+                  <a:avLst/>
+                </a:prstGeom>
+                <a:solidFill>
+                  <a:schemeClr val="tx1"/>
+                </a:solidFill>
+                <a:ln>
+                  <a:noFill/>
+                </a:ln>
+              </p:spPr>
+              <p:style>
+                <a:lnRef idx="2">
+                  <a:schemeClr val="accent1">
+                    <a:shade val="50000"/>
+                  </a:schemeClr>
+                </a:lnRef>
+                <a:fillRef idx="1">
+                  <a:schemeClr val="accent1"/>
+                </a:fillRef>
+                <a:effectRef idx="0">
+                  <a:schemeClr val="accent1"/>
+                </a:effectRef>
+                <a:fontRef idx="minor">
+                  <a:schemeClr val="lt1"/>
+                </a:fontRef>
+              </p:style>
+              <p:txBody>
+                <a:bodyPr rtlCol="0" anchor="ctr"/>
+                <a:lstStyle/>
+                <a:p>
+                  <a:pPr algn="ctr"/>
+                  <a:endParaRPr lang="en-US" dirty="0"/>
+                </a:p>
+              </p:txBody>
+            </p:sp>
+            <p:sp>
+              <p:nvSpPr>
+                <p:cNvPr id="11" name="Freeform 10">
+                  <a:extLst>
+                    <a:ext uri="{FF2B5EF4-FFF2-40B4-BE49-F238E27FC236}">
+                      <a16:creationId xmlns:a16="http://schemas.microsoft.com/office/drawing/2014/main" id="{D9474D3A-40BB-A44E-AA0D-88865263A5DD}"/>
+                    </a:ext>
+                  </a:extLst>
+                </p:cNvPr>
+                <p:cNvSpPr/>
+                <p:nvPr/>
+              </p:nvSpPr>
+              <p:spPr>
+                <a:xfrm>
+                  <a:off x="6129112" y="2850537"/>
+                  <a:ext cx="2086077" cy="2149692"/>
+                </a:xfrm>
+                <a:custGeom>
+                  <a:avLst/>
+                  <a:gdLst>
+                    <a:gd name="connsiteX0" fmla="*/ 226 w 2086077"/>
+                    <a:gd name="connsiteY0" fmla="*/ 688648 h 2149692"/>
+                    <a:gd name="connsiteX1" fmla="*/ 614588 w 2086077"/>
+                    <a:gd name="connsiteY1" fmla="*/ 17135 h 2149692"/>
+                    <a:gd name="connsiteX2" fmla="*/ 828901 w 2086077"/>
+                    <a:gd name="connsiteY2" fmla="*/ 288598 h 2149692"/>
+                    <a:gd name="connsiteX3" fmla="*/ 1986188 w 2086077"/>
+                    <a:gd name="connsiteY3" fmla="*/ 1231573 h 2149692"/>
+                    <a:gd name="connsiteX4" fmla="*/ 1986188 w 2086077"/>
+                    <a:gd name="connsiteY4" fmla="*/ 1988810 h 2149692"/>
+                    <a:gd name="connsiteX5" fmla="*/ 1643288 w 2086077"/>
+                    <a:gd name="connsiteY5" fmla="*/ 2031673 h 2149692"/>
+                    <a:gd name="connsiteX6" fmla="*/ 557438 w 2086077"/>
+                    <a:gd name="connsiteY6" fmla="*/ 674360 h 2149692"/>
+                    <a:gd name="connsiteX7" fmla="*/ 226 w 2086077"/>
+                    <a:gd name="connsiteY7" fmla="*/ 688648 h 2149692"/>
+                  </a:gdLst>
+                  <a:ahLst/>
+                  <a:cxnLst>
+                    <a:cxn ang="0">
+                      <a:pos x="connsiteX0" y="connsiteY0"/>
+                    </a:cxn>
+                    <a:cxn ang="0">
+                      <a:pos x="connsiteX1" y="connsiteY1"/>
+                    </a:cxn>
+                    <a:cxn ang="0">
+                      <a:pos x="connsiteX2" y="connsiteY2"/>
+                    </a:cxn>
+                    <a:cxn ang="0">
+                      <a:pos x="connsiteX3" y="connsiteY3"/>
+                    </a:cxn>
+                    <a:cxn ang="0">
+                      <a:pos x="connsiteX4" y="connsiteY4"/>
+                    </a:cxn>
+                    <a:cxn ang="0">
+                      <a:pos x="connsiteX5" y="connsiteY5"/>
+                    </a:cxn>
+                    <a:cxn ang="0">
+                      <a:pos x="connsiteX6" y="connsiteY6"/>
+                    </a:cxn>
+                    <a:cxn ang="0">
+                      <a:pos x="connsiteX7" y="connsiteY7"/>
+                    </a:cxn>
+                  </a:cxnLst>
+                  <a:rect l="l" t="t" r="r" b="b"/>
+                  <a:pathLst>
+                    <a:path w="2086077" h="2149692">
+                      <a:moveTo>
+                        <a:pt x="226" y="688648"/>
+                      </a:moveTo>
+                      <a:cubicBezTo>
+                        <a:pt x="9751" y="579111"/>
+                        <a:pt x="476475" y="83810"/>
+                        <a:pt x="614588" y="17135"/>
+                      </a:cubicBezTo>
+                      <a:cubicBezTo>
+                        <a:pt x="752701" y="-49540"/>
+                        <a:pt x="600301" y="86192"/>
+                        <a:pt x="828901" y="288598"/>
+                      </a:cubicBezTo>
+                      <a:cubicBezTo>
+                        <a:pt x="1057501" y="491004"/>
+                        <a:pt x="1793307" y="948204"/>
+                        <a:pt x="1986188" y="1231573"/>
+                      </a:cubicBezTo>
+                      <a:cubicBezTo>
+                        <a:pt x="2179069" y="1514942"/>
+                        <a:pt x="2043338" y="1855460"/>
+                        <a:pt x="1986188" y="1988810"/>
+                      </a:cubicBezTo>
+                      <a:cubicBezTo>
+                        <a:pt x="1929038" y="2122160"/>
+                        <a:pt x="1881413" y="2250748"/>
+                        <a:pt x="1643288" y="2031673"/>
+                      </a:cubicBezTo>
+                      <a:cubicBezTo>
+                        <a:pt x="1405163" y="1812598"/>
+                        <a:pt x="831282" y="893435"/>
+                        <a:pt x="557438" y="674360"/>
+                      </a:cubicBezTo>
+                      <a:cubicBezTo>
+                        <a:pt x="283594" y="455285"/>
+                        <a:pt x="-9299" y="798185"/>
+                        <a:pt x="226" y="688648"/>
+                      </a:cubicBezTo>
+                      <a:close/>
+                    </a:path>
+                  </a:pathLst>
+                </a:custGeom>
+                <a:solidFill>
+                  <a:schemeClr val="accent4">
+                    <a:lumMod val="75000"/>
+                    <a:alpha val="49000"/>
+                  </a:schemeClr>
+                </a:solidFill>
+                <a:ln>
+                  <a:noFill/>
+                </a:ln>
+              </p:spPr>
+              <p:style>
+                <a:lnRef idx="2">
+                  <a:schemeClr val="accent1">
+                    <a:shade val="50000"/>
+                  </a:schemeClr>
+                </a:lnRef>
+                <a:fillRef idx="1">
+                  <a:schemeClr val="accent1"/>
+                </a:fillRef>
+                <a:effectRef idx="0">
+                  <a:schemeClr val="accent1"/>
+                </a:effectRef>
+                <a:fontRef idx="minor">
+                  <a:schemeClr val="lt1"/>
+                </a:fontRef>
+              </p:style>
+              <p:txBody>
+                <a:bodyPr rtlCol="0" anchor="ctr"/>
+                <a:lstStyle/>
+                <a:p>
+                  <a:pPr algn="ctr"/>
+                  <a:endParaRPr lang="en-US" dirty="0"/>
+                </a:p>
+              </p:txBody>
+            </p:sp>
+            <p:sp>
+              <p:nvSpPr>
+                <p:cNvPr id="12" name="TextBox 11">
+                  <a:extLst>
+                    <a:ext uri="{FF2B5EF4-FFF2-40B4-BE49-F238E27FC236}">
+                      <a16:creationId xmlns:a16="http://schemas.microsoft.com/office/drawing/2014/main" id="{807E4626-E821-7746-9F3A-1C3358DDC491}"/>
+                    </a:ext>
+                  </a:extLst>
+                </p:cNvPr>
+                <p:cNvSpPr txBox="1"/>
+                <p:nvPr/>
+              </p:nvSpPr>
+              <p:spPr>
+                <a:xfrm>
+                  <a:off x="0" y="1311279"/>
+                  <a:ext cx="12192000" cy="2862322"/>
+                </a:xfrm>
+                <a:prstGeom prst="rect">
+                  <a:avLst/>
+                </a:prstGeom>
+                <a:noFill/>
+              </p:spPr>
+              <p:txBody>
+                <a:bodyPr wrap="square" rtlCol="0">
+                  <a:spAutoFit/>
+                </a:bodyPr>
+                <a:lstStyle/>
+                <a:p>
+                  <a:pPr algn="ctr"/>
+                  <a:r>
+                    <a:rPr lang="en-US" sz="17500" b="1" spc="200" dirty="0">
+                      <a:solidFill>
+                        <a:srgbClr val="C00000"/>
+                      </a:solidFill>
+                      <a:effectLst>
+                        <a:outerShdw blurRad="50800" dist="38100" dir="18900000" sx="101000" sy="101000" algn="bl" rotWithShape="0">
+                          <a:prstClr val="black"/>
+                        </a:outerShdw>
+                      </a:effectLst>
+                      <a:latin typeface="Bahiana" pitchFamily="2" charset="77"/>
+                    </a:rPr>
+                    <a:t>Merder Misstery</a:t>
+                  </a:r>
+                </a:p>
+              </p:txBody>
+            </p:sp>
+          </p:grpSp>
+          <p:sp>
+            <p:nvSpPr>
+              <p:cNvPr id="2" name="Rounded Rectangle 1">
+                <a:extLst>
+                  <a:ext uri="{FF2B5EF4-FFF2-40B4-BE49-F238E27FC236}">
+                    <a16:creationId xmlns:a16="http://schemas.microsoft.com/office/drawing/2014/main" id="{867358D6-E3C4-7D41-86E0-F033F41487CC}"/>
+                  </a:ext>
+                </a:extLst>
+              </p:cNvPr>
+              <p:cNvSpPr/>
+              <p:nvPr/>
+            </p:nvSpPr>
+            <p:spPr>
+              <a:xfrm>
+                <a:off x="4524375" y="5216424"/>
+                <a:ext cx="3143250" cy="845375"/>
+              </a:xfrm>
+              <a:prstGeom prst="roundRect">
+                <a:avLst/>
+              </a:prstGeom>
+              <a:solidFill>
+                <a:schemeClr val="accent4">
+                  <a:lumMod val="75000"/>
+                  <a:alpha val="49000"/>
+                </a:schemeClr>
+              </a:solidFill>
+              <a:ln>
+                <a:noFill/>
+              </a:ln>
+            </p:spPr>
+            <p:style>
+              <a:lnRef idx="2">
+                <a:schemeClr val="accent1">
+                  <a:shade val="50000"/>
+                </a:schemeClr>
+              </a:lnRef>
+              <a:fillRef idx="1">
+                <a:schemeClr val="accent1"/>
+              </a:fillRef>
+              <a:effectRef idx="0">
+                <a:schemeClr val="accent1"/>
+              </a:effectRef>
+              <a:fontRef idx="minor">
+                <a:schemeClr val="lt1"/>
+              </a:fontRef>
+            </p:style>
+            <p:txBody>
+              <a:bodyPr rtlCol="0" anchor="ctr"/>
+              <a:lstStyle/>
+              <a:p>
+                <a:pPr algn="ctr"/>
+                <a:r>
+                  <a:rPr lang="en-US" sz="4600" dirty="0">
+                    <a:solidFill>
+                      <a:schemeClr val="accent3"/>
+                    </a:solidFill>
+                    <a:latin typeface="Bahiana" pitchFamily="2" charset="77"/>
+                  </a:rPr>
+                  <a:t>Start Game</a:t>
+                </a:r>
+              </a:p>
+            </p:txBody>
+          </p:sp>
+        </p:grpSp>
+        <p:sp>
+          <p:nvSpPr>
+            <p:cNvPr id="6" name="TextBox 5">
+              <a:extLst>
+                <a:ext uri="{FF2B5EF4-FFF2-40B4-BE49-F238E27FC236}">
+                  <a16:creationId xmlns:a16="http://schemas.microsoft.com/office/drawing/2014/main" id="{26D80F72-8C27-F349-8332-21DA3C74179C}"/>
+                </a:ext>
+              </a:extLst>
+            </p:cNvPr>
+            <p:cNvSpPr txBox="1"/>
+            <p:nvPr/>
+          </p:nvSpPr>
+          <p:spPr>
+            <a:xfrm>
+              <a:off x="4524375" y="6136734"/>
+              <a:ext cx="3143250" cy="646331"/>
+            </a:xfrm>
+            <a:prstGeom prst="rect">
+              <a:avLst/>
+            </a:prstGeom>
+            <a:noFill/>
+          </p:spPr>
+          <p:txBody>
+            <a:bodyPr wrap="square" rtlCol="0">
+              <a:spAutoFit/>
+            </a:bodyPr>
+            <a:lstStyle/>
+            <a:p>
+              <a:pPr algn="ctr"/>
+              <a:r>
+                <a:rPr lang="en-US" sz="3600" dirty="0">
+                  <a:solidFill>
+                    <a:schemeClr val="accent3"/>
+                  </a:solidFill>
+                  <a:latin typeface="Bahiana" pitchFamily="2" charset="77"/>
+                </a:rPr>
+                <a:t>Press c for chat</a:t>
+              </a:r>
+            </a:p>
+          </p:txBody>
+        </p:sp>
+        <p:sp>
+          <p:nvSpPr>
+            <p:cNvPr id="15" name="Rounded Rectangle 14">
+              <a:extLst>
+                <a:ext uri="{FF2B5EF4-FFF2-40B4-BE49-F238E27FC236}">
+                  <a16:creationId xmlns:a16="http://schemas.microsoft.com/office/drawing/2014/main" id="{AF505674-49F0-8F4F-AC65-38ED4C334613}"/>
+                </a:ext>
+              </a:extLst>
+            </p:cNvPr>
+            <p:cNvSpPr/>
+            <p:nvPr/>
+          </p:nvSpPr>
+          <p:spPr>
+            <a:xfrm>
+              <a:off x="300264" y="5242049"/>
+              <a:ext cx="3143250" cy="845375"/>
+            </a:xfrm>
+            <a:prstGeom prst="roundRect">
+              <a:avLst/>
+            </a:prstGeom>
+            <a:solidFill>
+              <a:schemeClr val="accent4">
+                <a:lumMod val="75000"/>
+                <a:alpha val="49000"/>
+              </a:schemeClr>
+            </a:solidFill>
+            <a:ln>
+              <a:noFill/>
+            </a:ln>
+          </p:spPr>
+          <p:style>
+            <a:lnRef idx="2">
+              <a:schemeClr val="accent1">
+                <a:shade val="50000"/>
+              </a:schemeClr>
+            </a:lnRef>
+            <a:fillRef idx="1">
+              <a:schemeClr val="accent1"/>
+            </a:fillRef>
+            <a:effectRef idx="0">
+              <a:schemeClr val="accent1"/>
+            </a:effectRef>
+            <a:fontRef idx="minor">
+              <a:schemeClr val="lt1"/>
+            </a:fontRef>
+          </p:style>
+          <p:txBody>
+            <a:bodyPr rtlCol="0" anchor="ctr"/>
+            <a:lstStyle/>
+            <a:p>
+              <a:pPr algn="ctr"/>
+              <a:r>
+                <a:rPr lang="en-US" sz="4600" dirty="0">
+                  <a:solidFill>
+                    <a:schemeClr val="accent3"/>
+                  </a:solidFill>
+                  <a:latin typeface="Bahiana" pitchFamily="2" charset="77"/>
+                </a:rPr>
+                <a:t>Enter Seed</a:t>
+              </a:r>
+            </a:p>
+          </p:txBody>
+        </p:sp>
+        <p:sp>
+          <p:nvSpPr>
+            <p:cNvPr id="16" name="Rounded Rectangle 15">
+              <a:extLst>
+                <a:ext uri="{FF2B5EF4-FFF2-40B4-BE49-F238E27FC236}">
+                  <a16:creationId xmlns:a16="http://schemas.microsoft.com/office/drawing/2014/main" id="{64D84F14-8928-C046-AAA6-F63F05BB47B2}"/>
+                </a:ext>
+              </a:extLst>
+            </p:cNvPr>
+            <p:cNvSpPr/>
+            <p:nvPr/>
+          </p:nvSpPr>
+          <p:spPr>
+            <a:xfrm>
+              <a:off x="8748486" y="5242049"/>
+              <a:ext cx="3143250" cy="845375"/>
+            </a:xfrm>
+            <a:prstGeom prst="roundRect">
+              <a:avLst/>
+            </a:prstGeom>
+            <a:solidFill>
+              <a:schemeClr val="accent4">
+                <a:lumMod val="75000"/>
+                <a:alpha val="49000"/>
+              </a:schemeClr>
+            </a:solidFill>
+            <a:ln>
+              <a:noFill/>
+            </a:ln>
+          </p:spPr>
+          <p:style>
+            <a:lnRef idx="2">
+              <a:schemeClr val="accent1">
+                <a:shade val="50000"/>
+              </a:schemeClr>
+            </a:lnRef>
+            <a:fillRef idx="1">
+              <a:schemeClr val="accent1"/>
+            </a:fillRef>
+            <a:effectRef idx="0">
+              <a:schemeClr val="accent1"/>
+            </a:effectRef>
+            <a:fontRef idx="minor">
+              <a:schemeClr val="lt1"/>
+            </a:fontRef>
+          </p:style>
+          <p:txBody>
+            <a:bodyPr rtlCol="0" anchor="ctr"/>
+            <a:lstStyle/>
+            <a:p>
+              <a:pPr algn="ctr"/>
+              <a:r>
+                <a:rPr lang="en-US" sz="4600" dirty="0">
+                  <a:solidFill>
+                    <a:schemeClr val="accent3"/>
+                  </a:solidFill>
+                  <a:latin typeface="Bahiana" pitchFamily="2" charset="77"/>
+                </a:rPr>
+                <a:t>Roll Credits</a:t>
+              </a:r>
+            </a:p>
+          </p:txBody>
+        </p:sp>
+      </p:grpSp>
+    </p:spTree>
+    <p:extLst>
+      <p:ext uri="{BB962C8B-B14F-4D97-AF65-F5344CB8AC3E}">
+        <p14:creationId xmlns:p14="http://schemas.microsoft.com/office/powerpoint/2010/main" val="1762734033"/>
+      </p:ext>
+    </p:extLst>
+  </p:cSld>
+  <p:clrMapOvr>
+    <a:masterClrMapping/>
+  </p:clrMapOvr>
+</p:sld>
+</file>
+
+<file path=ppt/slides/slide3.xml><?xml version="1.0" encoding="utf-8"?>
+<p:sld xmlns:a="http://schemas.openxmlformats.org/drawingml/2006/main" xmlns:r="http://schemas.openxmlformats.org/officeDocument/2006/relationships" xmlns:p="http://schemas.openxmlformats.org/presentationml/2006/main">
+  <p:cSld>
+    <p:spTree>
+      <p:nvGrpSpPr>
+        <p:cNvPr id="1" name=""/>
+        <p:cNvGrpSpPr/>
+        <p:nvPr/>
+      </p:nvGrpSpPr>
+      <p:grpSpPr>
+        <a:xfrm>
+          <a:off x="0" y="0"/>
+          <a:ext cx="0" cy="0"/>
+          <a:chOff x="0" y="0"/>
+          <a:chExt cx="0" cy="0"/>
+        </a:xfrm>
+      </p:grpSpPr>
+      <p:grpSp>
+        <p:nvGrpSpPr>
+          <p:cNvPr id="7" name="Group 6">
+            <a:extLst>
+              <a:ext uri="{FF2B5EF4-FFF2-40B4-BE49-F238E27FC236}">
+                <a16:creationId xmlns:a16="http://schemas.microsoft.com/office/drawing/2014/main" id="{060CB379-5196-3A4B-8FC6-C63599EB77F4}"/>
+              </a:ext>
+            </a:extLst>
+          </p:cNvPr>
+          <p:cNvGrpSpPr/>
+          <p:nvPr/>
+        </p:nvGrpSpPr>
+        <p:grpSpPr>
+          <a:xfrm>
+            <a:off x="0" y="0"/>
+            <a:ext cx="12192000" cy="6858000"/>
+            <a:chOff x="0" y="0"/>
+            <a:chExt cx="12192000" cy="6858000"/>
+          </a:xfrm>
+        </p:grpSpPr>
+        <p:grpSp>
+          <p:nvGrpSpPr>
+            <p:cNvPr id="3" name="Group 2">
+              <a:extLst>
+                <a:ext uri="{FF2B5EF4-FFF2-40B4-BE49-F238E27FC236}">
+                  <a16:creationId xmlns:a16="http://schemas.microsoft.com/office/drawing/2014/main" id="{F5C13F6B-AE2F-774F-BA76-702281B87044}"/>
+                </a:ext>
+              </a:extLst>
+            </p:cNvPr>
+            <p:cNvGrpSpPr/>
+            <p:nvPr/>
+          </p:nvGrpSpPr>
+          <p:grpSpPr>
+            <a:xfrm>
+              <a:off x="0" y="0"/>
+              <a:ext cx="12192000" cy="6858000"/>
+              <a:chOff x="0" y="0"/>
+              <a:chExt cx="12192000" cy="6858000"/>
+            </a:xfrm>
+          </p:grpSpPr>
+          <p:sp>
+            <p:nvSpPr>
+              <p:cNvPr id="4" name="Rectangle 3">
+                <a:extLst>
+                  <a:ext uri="{FF2B5EF4-FFF2-40B4-BE49-F238E27FC236}">
+                    <a16:creationId xmlns:a16="http://schemas.microsoft.com/office/drawing/2014/main" id="{4063AAD3-E10F-3547-8177-B73D21CF5894}"/>
+                  </a:ext>
+                </a:extLst>
+              </p:cNvPr>
+              <p:cNvSpPr/>
+              <p:nvPr/>
+            </p:nvSpPr>
+            <p:spPr>
+              <a:xfrm>
+                <a:off x="0" y="0"/>
+                <a:ext cx="12192000" cy="6858000"/>
+              </a:xfrm>
+              <a:prstGeom prst="rect">
+                <a:avLst/>
+              </a:prstGeom>
+              <a:solidFill>
+                <a:schemeClr val="tx1"/>
+              </a:solidFill>
+            </p:spPr>
+            <p:style>
+              <a:lnRef idx="2">
+                <a:schemeClr val="accent1">
+                  <a:shade val="50000"/>
+                </a:schemeClr>
+              </a:lnRef>
+              <a:fillRef idx="1">
+                <a:schemeClr val="accent1"/>
+              </a:fillRef>
+              <a:effectRef idx="0">
+                <a:schemeClr val="accent1"/>
+              </a:effectRef>
+              <a:fontRef idx="minor">
+                <a:schemeClr val="lt1"/>
+              </a:fontRef>
+            </p:style>
+            <p:txBody>
+              <a:bodyPr rtlCol="0" anchor="ctr"/>
+              <a:lstStyle/>
+              <a:p>
+                <a:pPr algn="ctr"/>
+                <a:endParaRPr lang="en-US" dirty="0"/>
+              </a:p>
+            </p:txBody>
+          </p:sp>
+          <p:sp>
+            <p:nvSpPr>
+              <p:cNvPr id="9" name="Oval 8">
+                <a:extLst>
+                  <a:ext uri="{FF2B5EF4-FFF2-40B4-BE49-F238E27FC236}">
+                    <a16:creationId xmlns:a16="http://schemas.microsoft.com/office/drawing/2014/main" id="{65E9EB02-469B-D340-917A-E8E3AA6CA259}"/>
+                  </a:ext>
+                </a:extLst>
+              </p:cNvPr>
+              <p:cNvSpPr/>
+              <p:nvPr/>
+            </p:nvSpPr>
+            <p:spPr>
+              <a:xfrm>
+                <a:off x="4000500" y="440835"/>
+                <a:ext cx="2857500" cy="2873201"/>
+              </a:xfrm>
+              <a:prstGeom prst="ellipse">
+                <a:avLst/>
+              </a:prstGeom>
+              <a:solidFill>
+                <a:schemeClr val="accent4">
+                  <a:lumMod val="75000"/>
+                  <a:alpha val="49000"/>
+                </a:schemeClr>
+              </a:solidFill>
+              <a:ln>
+                <a:noFill/>
+              </a:ln>
+            </p:spPr>
+            <p:style>
+              <a:lnRef idx="2">
+                <a:schemeClr val="accent1">
+                  <a:shade val="50000"/>
+                </a:schemeClr>
+              </a:lnRef>
+              <a:fillRef idx="1">
+                <a:schemeClr val="accent1"/>
+              </a:fillRef>
+              <a:effectRef idx="0">
+                <a:schemeClr val="accent1"/>
+              </a:effectRef>
+              <a:fontRef idx="minor">
+                <a:schemeClr val="lt1"/>
+              </a:fontRef>
+            </p:style>
+            <p:txBody>
+              <a:bodyPr rtlCol="0" anchor="ctr"/>
+              <a:lstStyle/>
+              <a:p>
+                <a:pPr algn="ctr"/>
+                <a:endParaRPr lang="en-US" dirty="0"/>
+              </a:p>
+            </p:txBody>
+          </p:sp>
+          <p:sp>
+            <p:nvSpPr>
+              <p:cNvPr id="10" name="Oval 9">
+                <a:extLst>
+                  <a:ext uri="{FF2B5EF4-FFF2-40B4-BE49-F238E27FC236}">
+                    <a16:creationId xmlns:a16="http://schemas.microsoft.com/office/drawing/2014/main" id="{8BA33C70-0155-E84F-845F-ABB69789D9E8}"/>
+                  </a:ext>
+                </a:extLst>
+              </p:cNvPr>
+              <p:cNvSpPr/>
+              <p:nvPr/>
+            </p:nvSpPr>
+            <p:spPr>
+              <a:xfrm>
+                <a:off x="4329113" y="785636"/>
+                <a:ext cx="2214562" cy="2226731"/>
+              </a:xfrm>
+              <a:prstGeom prst="ellipse">
+                <a:avLst/>
+              </a:prstGeom>
+              <a:solidFill>
+                <a:schemeClr val="tx1"/>
+              </a:solidFill>
+              <a:ln>
+                <a:noFill/>
+              </a:ln>
+            </p:spPr>
+            <p:style>
+              <a:lnRef idx="2">
+                <a:schemeClr val="accent1">
+                  <a:shade val="50000"/>
+                </a:schemeClr>
+              </a:lnRef>
+              <a:fillRef idx="1">
+                <a:schemeClr val="accent1"/>
+              </a:fillRef>
+              <a:effectRef idx="0">
+                <a:schemeClr val="accent1"/>
+              </a:effectRef>
+              <a:fontRef idx="minor">
+                <a:schemeClr val="lt1"/>
+              </a:fontRef>
+            </p:style>
+            <p:txBody>
+              <a:bodyPr rtlCol="0" anchor="ctr"/>
+              <a:lstStyle/>
+              <a:p>
+                <a:pPr algn="ctr"/>
+                <a:endParaRPr lang="en-US" dirty="0"/>
+              </a:p>
+            </p:txBody>
+          </p:sp>
+          <p:sp>
+            <p:nvSpPr>
+              <p:cNvPr id="11" name="Freeform 10">
+                <a:extLst>
+                  <a:ext uri="{FF2B5EF4-FFF2-40B4-BE49-F238E27FC236}">
+                    <a16:creationId xmlns:a16="http://schemas.microsoft.com/office/drawing/2014/main" id="{D9474D3A-40BB-A44E-AA0D-88865263A5DD}"/>
+                  </a:ext>
+                </a:extLst>
+              </p:cNvPr>
+              <p:cNvSpPr/>
+              <p:nvPr/>
+            </p:nvSpPr>
+            <p:spPr>
+              <a:xfrm>
+                <a:off x="6129112" y="2850537"/>
+                <a:ext cx="2086077" cy="2149692"/>
+              </a:xfrm>
+              <a:custGeom>
+                <a:avLst/>
+                <a:gdLst>
+                  <a:gd name="connsiteX0" fmla="*/ 226 w 2086077"/>
+                  <a:gd name="connsiteY0" fmla="*/ 688648 h 2149692"/>
+                  <a:gd name="connsiteX1" fmla="*/ 614588 w 2086077"/>
+                  <a:gd name="connsiteY1" fmla="*/ 17135 h 2149692"/>
+                  <a:gd name="connsiteX2" fmla="*/ 828901 w 2086077"/>
+                  <a:gd name="connsiteY2" fmla="*/ 288598 h 2149692"/>
+                  <a:gd name="connsiteX3" fmla="*/ 1986188 w 2086077"/>
+                  <a:gd name="connsiteY3" fmla="*/ 1231573 h 2149692"/>
+                  <a:gd name="connsiteX4" fmla="*/ 1986188 w 2086077"/>
+                  <a:gd name="connsiteY4" fmla="*/ 1988810 h 2149692"/>
+                  <a:gd name="connsiteX5" fmla="*/ 1643288 w 2086077"/>
+                  <a:gd name="connsiteY5" fmla="*/ 2031673 h 2149692"/>
+                  <a:gd name="connsiteX6" fmla="*/ 557438 w 2086077"/>
+                  <a:gd name="connsiteY6" fmla="*/ 674360 h 2149692"/>
+                  <a:gd name="connsiteX7" fmla="*/ 226 w 2086077"/>
+                  <a:gd name="connsiteY7" fmla="*/ 688648 h 2149692"/>
+                </a:gdLst>
+                <a:ahLst/>
+                <a:cxnLst>
+                  <a:cxn ang="0">
+                    <a:pos x="connsiteX0" y="connsiteY0"/>
+                  </a:cxn>
+                  <a:cxn ang="0">
+                    <a:pos x="connsiteX1" y="connsiteY1"/>
+                  </a:cxn>
+                  <a:cxn ang="0">
+                    <a:pos x="connsiteX2" y="connsiteY2"/>
+                  </a:cxn>
+                  <a:cxn ang="0">
+                    <a:pos x="connsiteX3" y="connsiteY3"/>
+                  </a:cxn>
+                  <a:cxn ang="0">
+                    <a:pos x="connsiteX4" y="connsiteY4"/>
+                  </a:cxn>
+                  <a:cxn ang="0">
+                    <a:pos x="connsiteX5" y="connsiteY5"/>
+                  </a:cxn>
+                  <a:cxn ang="0">
+                    <a:pos x="connsiteX6" y="connsiteY6"/>
+                  </a:cxn>
+                  <a:cxn ang="0">
+                    <a:pos x="connsiteX7" y="connsiteY7"/>
+                  </a:cxn>
+                </a:cxnLst>
+                <a:rect l="l" t="t" r="r" b="b"/>
+                <a:pathLst>
+                  <a:path w="2086077" h="2149692">
+                    <a:moveTo>
+                      <a:pt x="226" y="688648"/>
+                    </a:moveTo>
+                    <a:cubicBezTo>
+                      <a:pt x="9751" y="579111"/>
+                      <a:pt x="476475" y="83810"/>
+                      <a:pt x="614588" y="17135"/>
+                    </a:cubicBezTo>
+                    <a:cubicBezTo>
+                      <a:pt x="752701" y="-49540"/>
+                      <a:pt x="600301" y="86192"/>
+                      <a:pt x="828901" y="288598"/>
+                    </a:cubicBezTo>
+                    <a:cubicBezTo>
+                      <a:pt x="1057501" y="491004"/>
+                      <a:pt x="1793307" y="948204"/>
+                      <a:pt x="1986188" y="1231573"/>
+                    </a:cubicBezTo>
+                    <a:cubicBezTo>
+                      <a:pt x="2179069" y="1514942"/>
+                      <a:pt x="2043338" y="1855460"/>
+                      <a:pt x="1986188" y="1988810"/>
+                    </a:cubicBezTo>
+                    <a:cubicBezTo>
+                      <a:pt x="1929038" y="2122160"/>
+                      <a:pt x="1881413" y="2250748"/>
+                      <a:pt x="1643288" y="2031673"/>
+                    </a:cubicBezTo>
+                    <a:cubicBezTo>
+                      <a:pt x="1405163" y="1812598"/>
+                      <a:pt x="831282" y="893435"/>
+                      <a:pt x="557438" y="674360"/>
+                    </a:cubicBezTo>
+                    <a:cubicBezTo>
+                      <a:pt x="283594" y="455285"/>
+                      <a:pt x="-9299" y="798185"/>
+                      <a:pt x="226" y="688648"/>
+                    </a:cubicBezTo>
+                    <a:close/>
+                  </a:path>
+                </a:pathLst>
+              </a:custGeom>
+              <a:solidFill>
+                <a:schemeClr val="accent4">
+                  <a:lumMod val="75000"/>
+                  <a:alpha val="49000"/>
+                </a:schemeClr>
+              </a:solidFill>
+              <a:ln>
+                <a:noFill/>
+              </a:ln>
+            </p:spPr>
+            <p:style>
+              <a:lnRef idx="2">
+                <a:schemeClr val="accent1">
+                  <a:shade val="50000"/>
+                </a:schemeClr>
+              </a:lnRef>
+              <a:fillRef idx="1">
+                <a:schemeClr val="accent1"/>
+              </a:fillRef>
+              <a:effectRef idx="0">
+                <a:schemeClr val="accent1"/>
+              </a:effectRef>
+              <a:fontRef idx="minor">
+                <a:schemeClr val="lt1"/>
+              </a:fontRef>
+            </p:style>
+            <p:txBody>
+              <a:bodyPr rtlCol="0" anchor="ctr"/>
+              <a:lstStyle/>
+              <a:p>
+                <a:pPr algn="ctr"/>
+                <a:endParaRPr lang="en-US" dirty="0"/>
+              </a:p>
+            </p:txBody>
+          </p:sp>
+          <p:sp>
+            <p:nvSpPr>
+              <p:cNvPr id="12" name="TextBox 11">
+                <a:extLst>
+                  <a:ext uri="{FF2B5EF4-FFF2-40B4-BE49-F238E27FC236}">
+                    <a16:creationId xmlns:a16="http://schemas.microsoft.com/office/drawing/2014/main" id="{807E4626-E821-7746-9F3A-1C3358DDC491}"/>
+                  </a:ext>
+                </a:extLst>
+              </p:cNvPr>
+              <p:cNvSpPr txBox="1"/>
+              <p:nvPr/>
+            </p:nvSpPr>
+            <p:spPr>
+              <a:xfrm>
+                <a:off x="0" y="1311279"/>
+                <a:ext cx="12192000" cy="2862322"/>
+              </a:xfrm>
+              <a:prstGeom prst="rect">
+                <a:avLst/>
+              </a:prstGeom>
+              <a:noFill/>
+            </p:spPr>
+            <p:txBody>
+              <a:bodyPr wrap="square" rtlCol="0">
+                <a:spAutoFit/>
+              </a:bodyPr>
+              <a:lstStyle/>
+              <a:p>
+                <a:pPr algn="ctr"/>
+                <a:r>
+                  <a:rPr lang="en-US" sz="17500" b="1" spc="200" dirty="0">
+                    <a:solidFill>
+                      <a:srgbClr val="C00000"/>
+                    </a:solidFill>
+                    <a:effectLst>
+                      <a:outerShdw blurRad="50800" dist="38100" dir="18900000" sx="101000" sy="101000" algn="bl" rotWithShape="0">
+                        <a:prstClr val="black"/>
+                      </a:outerShdw>
+                    </a:effectLst>
+                    <a:latin typeface="Bahiana" pitchFamily="2" charset="77"/>
+                  </a:rPr>
+                  <a:t>Merder Misstery</a:t>
+                </a:r>
+              </a:p>
+            </p:txBody>
+          </p:sp>
+        </p:grpSp>
+        <p:sp>
+          <p:nvSpPr>
+            <p:cNvPr id="6" name="TextBox 5">
+              <a:extLst>
+                <a:ext uri="{FF2B5EF4-FFF2-40B4-BE49-F238E27FC236}">
+                  <a16:creationId xmlns:a16="http://schemas.microsoft.com/office/drawing/2014/main" id="{26D80F72-8C27-F349-8332-21DA3C74179C}"/>
+                </a:ext>
+              </a:extLst>
+            </p:cNvPr>
+            <p:cNvSpPr txBox="1"/>
+            <p:nvPr/>
+          </p:nvSpPr>
+          <p:spPr>
+            <a:xfrm>
+              <a:off x="0" y="5430901"/>
+              <a:ext cx="12192000" cy="861774"/>
+            </a:xfrm>
+            <a:prstGeom prst="rect">
+              <a:avLst/>
+            </a:prstGeom>
+            <a:noFill/>
+          </p:spPr>
+          <p:txBody>
+            <a:bodyPr wrap="square" rtlCol="0">
+              <a:spAutoFit/>
+            </a:bodyPr>
+            <a:lstStyle/>
+            <a:p>
+              <a:pPr algn="ctr"/>
+              <a:r>
+                <a:rPr lang="en-US" sz="5000" dirty="0">
+                  <a:solidFill>
+                    <a:schemeClr val="accent3"/>
+                  </a:solidFill>
+                  <a:latin typeface="Bahiana" pitchFamily="2" charset="77"/>
+                </a:rPr>
+                <a:t>Generating characters . . . Please wait</a:t>
+              </a:r>
+            </a:p>
+          </p:txBody>
+        </p:sp>
+      </p:grpSp>
+    </p:spTree>
+    <p:extLst>
+      <p:ext uri="{BB962C8B-B14F-4D97-AF65-F5344CB8AC3E}">
+        <p14:creationId xmlns:p14="http://schemas.microsoft.com/office/powerpoint/2010/main" val="200053937"/>
       </p:ext>
     </p:extLst>
   </p:cSld>

</xml_diff>

<commit_message>
updated blank template spacing
</commit_message>
<xml_diff>
--- a/Art/Logo/Logo.pptx
+++ b/Art/Logo/Logo.pptx
@@ -5,7 +5,7 @@
     <p:sldMasterId id="2147483648" r:id="rId1"/>
   </p:sldMasterIdLst>
   <p:sldIdLst>
-    <p:sldId id="257" r:id="rId2"/>
+    <p:sldId id="261" r:id="rId2"/>
     <p:sldId id="259" r:id="rId3"/>
     <p:sldId id="260" r:id="rId4"/>
   </p:sldIdLst>
@@ -3414,7 +3414,7 @@
           </p:nvSpPr>
           <p:spPr>
             <a:xfrm>
-              <a:off x="4000500" y="1173613"/>
+              <a:off x="4000500" y="440835"/>
               <a:ext cx="2857500" cy="2873201"/>
             </a:xfrm>
             <a:prstGeom prst="ellipse">
@@ -3469,7 +3469,7 @@
           </p:nvSpPr>
           <p:spPr>
             <a:xfrm>
-              <a:off x="4329113" y="1518414"/>
+              <a:off x="4329113" y="785636"/>
               <a:ext cx="2214562" cy="2226731"/>
             </a:xfrm>
             <a:prstGeom prst="ellipse">
@@ -3521,7 +3521,7 @@
           </p:nvSpPr>
           <p:spPr>
             <a:xfrm>
-              <a:off x="6129112" y="3583315"/>
+              <a:off x="6129112" y="2850537"/>
               <a:ext cx="2086077" cy="2149692"/>
             </a:xfrm>
             <a:custGeom>
@@ -3665,7 +3665,7 @@
           </p:nvSpPr>
           <p:spPr>
             <a:xfrm>
-              <a:off x="0" y="1735841"/>
+              <a:off x="0" y="1311279"/>
               <a:ext cx="12192000" cy="2862322"/>
             </a:xfrm>
             <a:prstGeom prst="rect">
@@ -3701,7 +3701,7 @@
     </p:spTree>
     <p:extLst>
       <p:ext uri="{BB962C8B-B14F-4D97-AF65-F5344CB8AC3E}">
-        <p14:creationId xmlns:p14="http://schemas.microsoft.com/office/powerpoint/2010/main" val="218626717"/>
+        <p14:creationId xmlns:p14="http://schemas.microsoft.com/office/powerpoint/2010/main" val="2023613088"/>
       </p:ext>
     </p:extLst>
   </p:cSld>

</xml_diff>

<commit_message>
fixed image sizes (background 100%) in ppt
</commit_message>
<xml_diff>
--- a/Art/Logo/Logo.pptx
+++ b/Art/Logo/Logo.pptx
@@ -4406,10 +4406,10 @@
       </p:grpSpPr>
       <p:grpSp>
         <p:nvGrpSpPr>
-          <p:cNvPr id="13" name="Group 12">
-            <a:extLst>
-              <a:ext uri="{FF2B5EF4-FFF2-40B4-BE49-F238E27FC236}">
-                <a16:creationId xmlns:a16="http://schemas.microsoft.com/office/drawing/2014/main" id="{BA4A1352-1666-7248-A21F-65C0C5890919}"/>
+          <p:cNvPr id="2" name="Group 1">
+            <a:extLst>
+              <a:ext uri="{FF2B5EF4-FFF2-40B4-BE49-F238E27FC236}">
+                <a16:creationId xmlns:a16="http://schemas.microsoft.com/office/drawing/2014/main" id="{841F9286-2D07-FA42-89A0-0AC35C66161E}"/>
               </a:ext>
             </a:extLst>
           </p:cNvPr>
@@ -4424,317 +4424,384 @@
             <a:chExt cx="13944601" cy="7137891"/>
           </a:xfrm>
         </p:grpSpPr>
-        <p:sp>
-          <p:nvSpPr>
-            <p:cNvPr id="14" name="Rectangle 13">
+        <p:grpSp>
+          <p:nvGrpSpPr>
+            <p:cNvPr id="13" name="Group 12">
               <a:extLst>
                 <a:ext uri="{FF2B5EF4-FFF2-40B4-BE49-F238E27FC236}">
-                  <a16:creationId xmlns:a16="http://schemas.microsoft.com/office/drawing/2014/main" id="{6DE7272C-6897-2445-B3C7-4EF628A748E9}"/>
+                  <a16:creationId xmlns:a16="http://schemas.microsoft.com/office/drawing/2014/main" id="{BA4A1352-1666-7248-A21F-65C0C5890919}"/>
                 </a:ext>
               </a:extLst>
             </p:cNvPr>
-            <p:cNvSpPr>
-              <a:spLocks/>
-            </p:cNvSpPr>
+            <p:cNvGrpSpPr/>
             <p:nvPr/>
-          </p:nvSpPr>
-          <p:spPr>
+          </p:nvGrpSpPr>
+          <p:grpSpPr>
             <a:xfrm>
               <a:off x="-876301" y="-31119"/>
               <a:ext cx="13944601" cy="7137891"/>
+              <a:chOff x="-876301" y="-31119"/>
+              <a:chExt cx="13944601" cy="7137891"/>
             </a:xfrm>
-            <a:prstGeom prst="rect">
-              <a:avLst/>
-            </a:prstGeom>
-            <a:solidFill>
-              <a:schemeClr val="tx1"/>
-            </a:solidFill>
-            <a:ln>
+          </p:grpSpPr>
+          <p:sp>
+            <p:nvSpPr>
+              <p:cNvPr id="14" name="Rectangle 13">
+                <a:extLst>
+                  <a:ext uri="{FF2B5EF4-FFF2-40B4-BE49-F238E27FC236}">
+                    <a16:creationId xmlns:a16="http://schemas.microsoft.com/office/drawing/2014/main" id="{6DE7272C-6897-2445-B3C7-4EF628A748E9}"/>
+                  </a:ext>
+                </a:extLst>
+              </p:cNvPr>
+              <p:cNvSpPr>
+                <a:spLocks/>
+              </p:cNvSpPr>
+              <p:nvPr/>
+            </p:nvSpPr>
+            <p:spPr>
+              <a:xfrm>
+                <a:off x="-876301" y="-31119"/>
+                <a:ext cx="13944601" cy="7137891"/>
+              </a:xfrm>
+              <a:prstGeom prst="rect">
+                <a:avLst/>
+              </a:prstGeom>
+              <a:solidFill>
+                <a:schemeClr val="tx1"/>
+              </a:solidFill>
+              <a:ln>
+                <a:noFill/>
+              </a:ln>
+            </p:spPr>
+            <p:style>
+              <a:lnRef idx="2">
+                <a:schemeClr val="accent1">
+                  <a:shade val="50000"/>
+                </a:schemeClr>
+              </a:lnRef>
+              <a:fillRef idx="1">
+                <a:schemeClr val="accent1"/>
+              </a:fillRef>
+              <a:effectRef idx="0">
+                <a:schemeClr val="accent1"/>
+              </a:effectRef>
+              <a:fontRef idx="minor">
+                <a:schemeClr val="lt1"/>
+              </a:fontRef>
+            </p:style>
+            <p:txBody>
+              <a:bodyPr rtlCol="0" anchor="ctr"/>
+              <a:lstStyle/>
+              <a:p>
+                <a:pPr algn="ctr"/>
+                <a:endParaRPr lang="en-US" dirty="0"/>
+              </a:p>
+            </p:txBody>
+          </p:sp>
+          <p:sp>
+            <p:nvSpPr>
+              <p:cNvPr id="15" name="Oval 14">
+                <a:extLst>
+                  <a:ext uri="{FF2B5EF4-FFF2-40B4-BE49-F238E27FC236}">
+                    <a16:creationId xmlns:a16="http://schemas.microsoft.com/office/drawing/2014/main" id="{F4D0AC79-0305-294A-8A27-997429825929}"/>
+                  </a:ext>
+                </a:extLst>
+              </p:cNvPr>
+              <p:cNvSpPr/>
+              <p:nvPr/>
+            </p:nvSpPr>
+            <p:spPr>
+              <a:xfrm>
+                <a:off x="4000500" y="440835"/>
+                <a:ext cx="2857500" cy="2873201"/>
+              </a:xfrm>
+              <a:prstGeom prst="ellipse">
+                <a:avLst/>
+              </a:prstGeom>
+              <a:solidFill>
+                <a:schemeClr val="accent4">
+                  <a:lumMod val="75000"/>
+                  <a:alpha val="49000"/>
+                </a:schemeClr>
+              </a:solidFill>
+              <a:ln>
+                <a:noFill/>
+              </a:ln>
+            </p:spPr>
+            <p:style>
+              <a:lnRef idx="2">
+                <a:schemeClr val="accent1">
+                  <a:shade val="50000"/>
+                </a:schemeClr>
+              </a:lnRef>
+              <a:fillRef idx="1">
+                <a:schemeClr val="accent1"/>
+              </a:fillRef>
+              <a:effectRef idx="0">
+                <a:schemeClr val="accent1"/>
+              </a:effectRef>
+              <a:fontRef idx="minor">
+                <a:schemeClr val="lt1"/>
+              </a:fontRef>
+            </p:style>
+            <p:txBody>
+              <a:bodyPr rtlCol="0" anchor="ctr"/>
+              <a:lstStyle/>
+              <a:p>
+                <a:pPr algn="ctr"/>
+                <a:endParaRPr lang="en-US" dirty="0"/>
+              </a:p>
+            </p:txBody>
+          </p:sp>
+          <p:sp>
+            <p:nvSpPr>
+              <p:cNvPr id="16" name="Oval 15">
+                <a:extLst>
+                  <a:ext uri="{FF2B5EF4-FFF2-40B4-BE49-F238E27FC236}">
+                    <a16:creationId xmlns:a16="http://schemas.microsoft.com/office/drawing/2014/main" id="{5A8B3E5E-85A7-B647-80E9-A24BD66D558B}"/>
+                  </a:ext>
+                </a:extLst>
+              </p:cNvPr>
+              <p:cNvSpPr/>
+              <p:nvPr/>
+            </p:nvSpPr>
+            <p:spPr>
+              <a:xfrm>
+                <a:off x="4329113" y="785636"/>
+                <a:ext cx="2214562" cy="2226731"/>
+              </a:xfrm>
+              <a:prstGeom prst="ellipse">
+                <a:avLst/>
+              </a:prstGeom>
+              <a:solidFill>
+                <a:schemeClr val="tx1"/>
+              </a:solidFill>
+              <a:ln>
+                <a:noFill/>
+              </a:ln>
+            </p:spPr>
+            <p:style>
+              <a:lnRef idx="2">
+                <a:schemeClr val="accent1">
+                  <a:shade val="50000"/>
+                </a:schemeClr>
+              </a:lnRef>
+              <a:fillRef idx="1">
+                <a:schemeClr val="accent1"/>
+              </a:fillRef>
+              <a:effectRef idx="0">
+                <a:schemeClr val="accent1"/>
+              </a:effectRef>
+              <a:fontRef idx="minor">
+                <a:schemeClr val="lt1"/>
+              </a:fontRef>
+            </p:style>
+            <p:txBody>
+              <a:bodyPr rtlCol="0" anchor="ctr"/>
+              <a:lstStyle/>
+              <a:p>
+                <a:pPr algn="ctr"/>
+                <a:endParaRPr lang="en-US" dirty="0"/>
+              </a:p>
+            </p:txBody>
+          </p:sp>
+          <p:sp>
+            <p:nvSpPr>
+              <p:cNvPr id="17" name="Freeform 16">
+                <a:extLst>
+                  <a:ext uri="{FF2B5EF4-FFF2-40B4-BE49-F238E27FC236}">
+                    <a16:creationId xmlns:a16="http://schemas.microsoft.com/office/drawing/2014/main" id="{05B8023C-75B1-D242-A1AC-998EC653D122}"/>
+                  </a:ext>
+                </a:extLst>
+              </p:cNvPr>
+              <p:cNvSpPr/>
+              <p:nvPr/>
+            </p:nvSpPr>
+            <p:spPr>
+              <a:xfrm>
+                <a:off x="6129112" y="2850537"/>
+                <a:ext cx="2086077" cy="2149692"/>
+              </a:xfrm>
+              <a:custGeom>
+                <a:avLst/>
+                <a:gdLst>
+                  <a:gd name="connsiteX0" fmla="*/ 226 w 2086077"/>
+                  <a:gd name="connsiteY0" fmla="*/ 688648 h 2149692"/>
+                  <a:gd name="connsiteX1" fmla="*/ 614588 w 2086077"/>
+                  <a:gd name="connsiteY1" fmla="*/ 17135 h 2149692"/>
+                  <a:gd name="connsiteX2" fmla="*/ 828901 w 2086077"/>
+                  <a:gd name="connsiteY2" fmla="*/ 288598 h 2149692"/>
+                  <a:gd name="connsiteX3" fmla="*/ 1986188 w 2086077"/>
+                  <a:gd name="connsiteY3" fmla="*/ 1231573 h 2149692"/>
+                  <a:gd name="connsiteX4" fmla="*/ 1986188 w 2086077"/>
+                  <a:gd name="connsiteY4" fmla="*/ 1988810 h 2149692"/>
+                  <a:gd name="connsiteX5" fmla="*/ 1643288 w 2086077"/>
+                  <a:gd name="connsiteY5" fmla="*/ 2031673 h 2149692"/>
+                  <a:gd name="connsiteX6" fmla="*/ 557438 w 2086077"/>
+                  <a:gd name="connsiteY6" fmla="*/ 674360 h 2149692"/>
+                  <a:gd name="connsiteX7" fmla="*/ 226 w 2086077"/>
+                  <a:gd name="connsiteY7" fmla="*/ 688648 h 2149692"/>
+                </a:gdLst>
+                <a:ahLst/>
+                <a:cxnLst>
+                  <a:cxn ang="0">
+                    <a:pos x="connsiteX0" y="connsiteY0"/>
+                  </a:cxn>
+                  <a:cxn ang="0">
+                    <a:pos x="connsiteX1" y="connsiteY1"/>
+                  </a:cxn>
+                  <a:cxn ang="0">
+                    <a:pos x="connsiteX2" y="connsiteY2"/>
+                  </a:cxn>
+                  <a:cxn ang="0">
+                    <a:pos x="connsiteX3" y="connsiteY3"/>
+                  </a:cxn>
+                  <a:cxn ang="0">
+                    <a:pos x="connsiteX4" y="connsiteY4"/>
+                  </a:cxn>
+                  <a:cxn ang="0">
+                    <a:pos x="connsiteX5" y="connsiteY5"/>
+                  </a:cxn>
+                  <a:cxn ang="0">
+                    <a:pos x="connsiteX6" y="connsiteY6"/>
+                  </a:cxn>
+                  <a:cxn ang="0">
+                    <a:pos x="connsiteX7" y="connsiteY7"/>
+                  </a:cxn>
+                </a:cxnLst>
+                <a:rect l="l" t="t" r="r" b="b"/>
+                <a:pathLst>
+                  <a:path w="2086077" h="2149692">
+                    <a:moveTo>
+                      <a:pt x="226" y="688648"/>
+                    </a:moveTo>
+                    <a:cubicBezTo>
+                      <a:pt x="9751" y="579111"/>
+                      <a:pt x="476475" y="83810"/>
+                      <a:pt x="614588" y="17135"/>
+                    </a:cubicBezTo>
+                    <a:cubicBezTo>
+                      <a:pt x="752701" y="-49540"/>
+                      <a:pt x="600301" y="86192"/>
+                      <a:pt x="828901" y="288598"/>
+                    </a:cubicBezTo>
+                    <a:cubicBezTo>
+                      <a:pt x="1057501" y="491004"/>
+                      <a:pt x="1793307" y="948204"/>
+                      <a:pt x="1986188" y="1231573"/>
+                    </a:cubicBezTo>
+                    <a:cubicBezTo>
+                      <a:pt x="2179069" y="1514942"/>
+                      <a:pt x="2043338" y="1855460"/>
+                      <a:pt x="1986188" y="1988810"/>
+                    </a:cubicBezTo>
+                    <a:cubicBezTo>
+                      <a:pt x="1929038" y="2122160"/>
+                      <a:pt x="1881413" y="2250748"/>
+                      <a:pt x="1643288" y="2031673"/>
+                    </a:cubicBezTo>
+                    <a:cubicBezTo>
+                      <a:pt x="1405163" y="1812598"/>
+                      <a:pt x="831282" y="893435"/>
+                      <a:pt x="557438" y="674360"/>
+                    </a:cubicBezTo>
+                    <a:cubicBezTo>
+                      <a:pt x="283594" y="455285"/>
+                      <a:pt x="-9299" y="798185"/>
+                      <a:pt x="226" y="688648"/>
+                    </a:cubicBezTo>
+                    <a:close/>
+                  </a:path>
+                </a:pathLst>
+              </a:custGeom>
+              <a:solidFill>
+                <a:schemeClr val="accent4">
+                  <a:lumMod val="75000"/>
+                  <a:alpha val="49000"/>
+                </a:schemeClr>
+              </a:solidFill>
+              <a:ln>
+                <a:noFill/>
+              </a:ln>
+            </p:spPr>
+            <p:style>
+              <a:lnRef idx="2">
+                <a:schemeClr val="accent1">
+                  <a:shade val="50000"/>
+                </a:schemeClr>
+              </a:lnRef>
+              <a:fillRef idx="1">
+                <a:schemeClr val="accent1"/>
+              </a:fillRef>
+              <a:effectRef idx="0">
+                <a:schemeClr val="accent1"/>
+              </a:effectRef>
+              <a:fontRef idx="minor">
+                <a:schemeClr val="lt1"/>
+              </a:fontRef>
+            </p:style>
+            <p:txBody>
+              <a:bodyPr rtlCol="0" anchor="ctr"/>
+              <a:lstStyle/>
+              <a:p>
+                <a:pPr algn="ctr"/>
+                <a:endParaRPr lang="en-US" dirty="0"/>
+              </a:p>
+            </p:txBody>
+          </p:sp>
+          <p:sp>
+            <p:nvSpPr>
+              <p:cNvPr id="18" name="TextBox 17">
+                <a:extLst>
+                  <a:ext uri="{FF2B5EF4-FFF2-40B4-BE49-F238E27FC236}">
+                    <a16:creationId xmlns:a16="http://schemas.microsoft.com/office/drawing/2014/main" id="{194F662B-DF2D-FA45-A6FA-AAC0EC7F38B2}"/>
+                  </a:ext>
+                </a:extLst>
+              </p:cNvPr>
+              <p:cNvSpPr txBox="1"/>
+              <p:nvPr/>
+            </p:nvSpPr>
+            <p:spPr>
+              <a:xfrm>
+                <a:off x="0" y="1311279"/>
+                <a:ext cx="12192000" cy="2862322"/>
+              </a:xfrm>
+              <a:prstGeom prst="rect">
+                <a:avLst/>
+              </a:prstGeom>
               <a:noFill/>
-            </a:ln>
-          </p:spPr>
-          <p:style>
-            <a:lnRef idx="2">
-              <a:schemeClr val="accent1">
-                <a:shade val="50000"/>
-              </a:schemeClr>
-            </a:lnRef>
-            <a:fillRef idx="1">
-              <a:schemeClr val="accent1"/>
-            </a:fillRef>
-            <a:effectRef idx="0">
-              <a:schemeClr val="accent1"/>
-            </a:effectRef>
-            <a:fontRef idx="minor">
-              <a:schemeClr val="lt1"/>
-            </a:fontRef>
-          </p:style>
-          <p:txBody>
-            <a:bodyPr rtlCol="0" anchor="ctr"/>
-            <a:lstStyle/>
-            <a:p>
-              <a:pPr algn="ctr"/>
-              <a:endParaRPr lang="en-US" dirty="0"/>
-            </a:p>
-          </p:txBody>
-        </p:sp>
+            </p:spPr>
+            <p:txBody>
+              <a:bodyPr wrap="square" rtlCol="0">
+                <a:spAutoFit/>
+              </a:bodyPr>
+              <a:lstStyle/>
+              <a:p>
+                <a:pPr algn="ctr"/>
+                <a:r>
+                  <a:rPr lang="en-US" sz="17500" b="1" spc="200" dirty="0">
+                    <a:solidFill>
+                      <a:srgbClr val="C00000"/>
+                    </a:solidFill>
+                    <a:effectLst>
+                      <a:outerShdw blurRad="50800" dist="38100" dir="18900000" sx="101000" sy="101000" algn="bl" rotWithShape="0">
+                        <a:prstClr val="black"/>
+                      </a:outerShdw>
+                    </a:effectLst>
+                    <a:latin typeface="Bahiana" pitchFamily="2" charset="77"/>
+                  </a:rPr>
+                  <a:t>Merder Misstery</a:t>
+                </a:r>
+              </a:p>
+            </p:txBody>
+          </p:sp>
+        </p:grpSp>
         <p:sp>
           <p:nvSpPr>
-            <p:cNvPr id="15" name="Oval 14">
+            <p:cNvPr id="6" name="TextBox 5">
               <a:extLst>
                 <a:ext uri="{FF2B5EF4-FFF2-40B4-BE49-F238E27FC236}">
-                  <a16:creationId xmlns:a16="http://schemas.microsoft.com/office/drawing/2014/main" id="{F4D0AC79-0305-294A-8A27-997429825929}"/>
-                </a:ext>
-              </a:extLst>
-            </p:cNvPr>
-            <p:cNvSpPr/>
-            <p:nvPr/>
-          </p:nvSpPr>
-          <p:spPr>
-            <a:xfrm>
-              <a:off x="4000500" y="440835"/>
-              <a:ext cx="2857500" cy="2873201"/>
-            </a:xfrm>
-            <a:prstGeom prst="ellipse">
-              <a:avLst/>
-            </a:prstGeom>
-            <a:solidFill>
-              <a:schemeClr val="accent4">
-                <a:lumMod val="75000"/>
-                <a:alpha val="49000"/>
-              </a:schemeClr>
-            </a:solidFill>
-            <a:ln>
-              <a:noFill/>
-            </a:ln>
-          </p:spPr>
-          <p:style>
-            <a:lnRef idx="2">
-              <a:schemeClr val="accent1">
-                <a:shade val="50000"/>
-              </a:schemeClr>
-            </a:lnRef>
-            <a:fillRef idx="1">
-              <a:schemeClr val="accent1"/>
-            </a:fillRef>
-            <a:effectRef idx="0">
-              <a:schemeClr val="accent1"/>
-            </a:effectRef>
-            <a:fontRef idx="minor">
-              <a:schemeClr val="lt1"/>
-            </a:fontRef>
-          </p:style>
-          <p:txBody>
-            <a:bodyPr rtlCol="0" anchor="ctr"/>
-            <a:lstStyle/>
-            <a:p>
-              <a:pPr algn="ctr"/>
-              <a:endParaRPr lang="en-US" dirty="0"/>
-            </a:p>
-          </p:txBody>
-        </p:sp>
-        <p:sp>
-          <p:nvSpPr>
-            <p:cNvPr id="16" name="Oval 15">
-              <a:extLst>
-                <a:ext uri="{FF2B5EF4-FFF2-40B4-BE49-F238E27FC236}">
-                  <a16:creationId xmlns:a16="http://schemas.microsoft.com/office/drawing/2014/main" id="{5A8B3E5E-85A7-B647-80E9-A24BD66D558B}"/>
-                </a:ext>
-              </a:extLst>
-            </p:cNvPr>
-            <p:cNvSpPr/>
-            <p:nvPr/>
-          </p:nvSpPr>
-          <p:spPr>
-            <a:xfrm>
-              <a:off x="4329113" y="785636"/>
-              <a:ext cx="2214562" cy="2226731"/>
-            </a:xfrm>
-            <a:prstGeom prst="ellipse">
-              <a:avLst/>
-            </a:prstGeom>
-            <a:solidFill>
-              <a:schemeClr val="tx1"/>
-            </a:solidFill>
-            <a:ln>
-              <a:noFill/>
-            </a:ln>
-          </p:spPr>
-          <p:style>
-            <a:lnRef idx="2">
-              <a:schemeClr val="accent1">
-                <a:shade val="50000"/>
-              </a:schemeClr>
-            </a:lnRef>
-            <a:fillRef idx="1">
-              <a:schemeClr val="accent1"/>
-            </a:fillRef>
-            <a:effectRef idx="0">
-              <a:schemeClr val="accent1"/>
-            </a:effectRef>
-            <a:fontRef idx="minor">
-              <a:schemeClr val="lt1"/>
-            </a:fontRef>
-          </p:style>
-          <p:txBody>
-            <a:bodyPr rtlCol="0" anchor="ctr"/>
-            <a:lstStyle/>
-            <a:p>
-              <a:pPr algn="ctr"/>
-              <a:endParaRPr lang="en-US" dirty="0"/>
-            </a:p>
-          </p:txBody>
-        </p:sp>
-        <p:sp>
-          <p:nvSpPr>
-            <p:cNvPr id="17" name="Freeform 16">
-              <a:extLst>
-                <a:ext uri="{FF2B5EF4-FFF2-40B4-BE49-F238E27FC236}">
-                  <a16:creationId xmlns:a16="http://schemas.microsoft.com/office/drawing/2014/main" id="{05B8023C-75B1-D242-A1AC-998EC653D122}"/>
-                </a:ext>
-              </a:extLst>
-            </p:cNvPr>
-            <p:cNvSpPr/>
-            <p:nvPr/>
-          </p:nvSpPr>
-          <p:spPr>
-            <a:xfrm>
-              <a:off x="6129112" y="2850537"/>
-              <a:ext cx="2086077" cy="2149692"/>
-            </a:xfrm>
-            <a:custGeom>
-              <a:avLst/>
-              <a:gdLst>
-                <a:gd name="connsiteX0" fmla="*/ 226 w 2086077"/>
-                <a:gd name="connsiteY0" fmla="*/ 688648 h 2149692"/>
-                <a:gd name="connsiteX1" fmla="*/ 614588 w 2086077"/>
-                <a:gd name="connsiteY1" fmla="*/ 17135 h 2149692"/>
-                <a:gd name="connsiteX2" fmla="*/ 828901 w 2086077"/>
-                <a:gd name="connsiteY2" fmla="*/ 288598 h 2149692"/>
-                <a:gd name="connsiteX3" fmla="*/ 1986188 w 2086077"/>
-                <a:gd name="connsiteY3" fmla="*/ 1231573 h 2149692"/>
-                <a:gd name="connsiteX4" fmla="*/ 1986188 w 2086077"/>
-                <a:gd name="connsiteY4" fmla="*/ 1988810 h 2149692"/>
-                <a:gd name="connsiteX5" fmla="*/ 1643288 w 2086077"/>
-                <a:gd name="connsiteY5" fmla="*/ 2031673 h 2149692"/>
-                <a:gd name="connsiteX6" fmla="*/ 557438 w 2086077"/>
-                <a:gd name="connsiteY6" fmla="*/ 674360 h 2149692"/>
-                <a:gd name="connsiteX7" fmla="*/ 226 w 2086077"/>
-                <a:gd name="connsiteY7" fmla="*/ 688648 h 2149692"/>
-              </a:gdLst>
-              <a:ahLst/>
-              <a:cxnLst>
-                <a:cxn ang="0">
-                  <a:pos x="connsiteX0" y="connsiteY0"/>
-                </a:cxn>
-                <a:cxn ang="0">
-                  <a:pos x="connsiteX1" y="connsiteY1"/>
-                </a:cxn>
-                <a:cxn ang="0">
-                  <a:pos x="connsiteX2" y="connsiteY2"/>
-                </a:cxn>
-                <a:cxn ang="0">
-                  <a:pos x="connsiteX3" y="connsiteY3"/>
-                </a:cxn>
-                <a:cxn ang="0">
-                  <a:pos x="connsiteX4" y="connsiteY4"/>
-                </a:cxn>
-                <a:cxn ang="0">
-                  <a:pos x="connsiteX5" y="connsiteY5"/>
-                </a:cxn>
-                <a:cxn ang="0">
-                  <a:pos x="connsiteX6" y="connsiteY6"/>
-                </a:cxn>
-                <a:cxn ang="0">
-                  <a:pos x="connsiteX7" y="connsiteY7"/>
-                </a:cxn>
-              </a:cxnLst>
-              <a:rect l="l" t="t" r="r" b="b"/>
-              <a:pathLst>
-                <a:path w="2086077" h="2149692">
-                  <a:moveTo>
-                    <a:pt x="226" y="688648"/>
-                  </a:moveTo>
-                  <a:cubicBezTo>
-                    <a:pt x="9751" y="579111"/>
-                    <a:pt x="476475" y="83810"/>
-                    <a:pt x="614588" y="17135"/>
-                  </a:cubicBezTo>
-                  <a:cubicBezTo>
-                    <a:pt x="752701" y="-49540"/>
-                    <a:pt x="600301" y="86192"/>
-                    <a:pt x="828901" y="288598"/>
-                  </a:cubicBezTo>
-                  <a:cubicBezTo>
-                    <a:pt x="1057501" y="491004"/>
-                    <a:pt x="1793307" y="948204"/>
-                    <a:pt x="1986188" y="1231573"/>
-                  </a:cubicBezTo>
-                  <a:cubicBezTo>
-                    <a:pt x="2179069" y="1514942"/>
-                    <a:pt x="2043338" y="1855460"/>
-                    <a:pt x="1986188" y="1988810"/>
-                  </a:cubicBezTo>
-                  <a:cubicBezTo>
-                    <a:pt x="1929038" y="2122160"/>
-                    <a:pt x="1881413" y="2250748"/>
-                    <a:pt x="1643288" y="2031673"/>
-                  </a:cubicBezTo>
-                  <a:cubicBezTo>
-                    <a:pt x="1405163" y="1812598"/>
-                    <a:pt x="831282" y="893435"/>
-                    <a:pt x="557438" y="674360"/>
-                  </a:cubicBezTo>
-                  <a:cubicBezTo>
-                    <a:pt x="283594" y="455285"/>
-                    <a:pt x="-9299" y="798185"/>
-                    <a:pt x="226" y="688648"/>
-                  </a:cubicBezTo>
-                  <a:close/>
-                </a:path>
-              </a:pathLst>
-            </a:custGeom>
-            <a:solidFill>
-              <a:schemeClr val="accent4">
-                <a:lumMod val="75000"/>
-                <a:alpha val="49000"/>
-              </a:schemeClr>
-            </a:solidFill>
-            <a:ln>
-              <a:noFill/>
-            </a:ln>
-          </p:spPr>
-          <p:style>
-            <a:lnRef idx="2">
-              <a:schemeClr val="accent1">
-                <a:shade val="50000"/>
-              </a:schemeClr>
-            </a:lnRef>
-            <a:fillRef idx="1">
-              <a:schemeClr val="accent1"/>
-            </a:fillRef>
-            <a:effectRef idx="0">
-              <a:schemeClr val="accent1"/>
-            </a:effectRef>
-            <a:fontRef idx="minor">
-              <a:schemeClr val="lt1"/>
-            </a:fontRef>
-          </p:style>
-          <p:txBody>
-            <a:bodyPr rtlCol="0" anchor="ctr"/>
-            <a:lstStyle/>
-            <a:p>
-              <a:pPr algn="ctr"/>
-              <a:endParaRPr lang="en-US" dirty="0"/>
-            </a:p>
-          </p:txBody>
-        </p:sp>
-        <p:sp>
-          <p:nvSpPr>
-            <p:cNvPr id="18" name="TextBox 17">
-              <a:extLst>
-                <a:ext uri="{FF2B5EF4-FFF2-40B4-BE49-F238E27FC236}">
-                  <a16:creationId xmlns:a16="http://schemas.microsoft.com/office/drawing/2014/main" id="{194F662B-DF2D-FA45-A6FA-AAC0EC7F38B2}"/>
+                  <a16:creationId xmlns:a16="http://schemas.microsoft.com/office/drawing/2014/main" id="{26D80F72-8C27-F349-8332-21DA3C74179C}"/>
                 </a:ext>
               </a:extLst>
             </p:cNvPr>
@@ -4743,8 +4810,8 @@
           </p:nvSpPr>
           <p:spPr>
             <a:xfrm>
-              <a:off x="0" y="1311279"/>
-              <a:ext cx="12192000" cy="2862322"/>
+              <a:off x="0" y="5430901"/>
+              <a:ext cx="12192000" cy="861774"/>
             </a:xfrm>
             <a:prstGeom prst="rect">
               <a:avLst/>
@@ -4759,64 +4826,18 @@
             <a:p>
               <a:pPr algn="ctr"/>
               <a:r>
-                <a:rPr lang="en-US" sz="17500" b="1" spc="200" dirty="0">
+                <a:rPr lang="en-US" sz="5000" dirty="0">
                   <a:solidFill>
-                    <a:srgbClr val="C00000"/>
+                    <a:schemeClr val="accent3"/>
                   </a:solidFill>
-                  <a:effectLst>
-                    <a:outerShdw blurRad="50800" dist="38100" dir="18900000" sx="101000" sy="101000" algn="bl" rotWithShape="0">
-                      <a:prstClr val="black"/>
-                    </a:outerShdw>
-                  </a:effectLst>
                   <a:latin typeface="Bahiana" pitchFamily="2" charset="77"/>
                 </a:rPr>
-                <a:t>Merder Misstery</a:t>
+                <a:t>Generating characters . . . Please wait</a:t>
               </a:r>
             </a:p>
           </p:txBody>
         </p:sp>
       </p:grpSp>
-      <p:sp>
-        <p:nvSpPr>
-          <p:cNvPr id="6" name="TextBox 5">
-            <a:extLst>
-              <a:ext uri="{FF2B5EF4-FFF2-40B4-BE49-F238E27FC236}">
-                <a16:creationId xmlns:a16="http://schemas.microsoft.com/office/drawing/2014/main" id="{26D80F72-8C27-F349-8332-21DA3C74179C}"/>
-              </a:ext>
-            </a:extLst>
-          </p:cNvPr>
-          <p:cNvSpPr txBox="1"/>
-          <p:nvPr/>
-        </p:nvSpPr>
-        <p:spPr>
-          <a:xfrm>
-            <a:off x="0" y="5430901"/>
-            <a:ext cx="12192000" cy="861774"/>
-          </a:xfrm>
-          <a:prstGeom prst="rect">
-            <a:avLst/>
-          </a:prstGeom>
-          <a:noFill/>
-        </p:spPr>
-        <p:txBody>
-          <a:bodyPr wrap="square" rtlCol="0">
-            <a:spAutoFit/>
-          </a:bodyPr>
-          <a:lstStyle/>
-          <a:p>
-            <a:pPr algn="ctr"/>
-            <a:r>
-              <a:rPr lang="en-US" sz="5000" dirty="0">
-                <a:solidFill>
-                  <a:schemeClr val="accent3"/>
-                </a:solidFill>
-                <a:latin typeface="Bahiana" pitchFamily="2" charset="77"/>
-              </a:rPr>
-              <a:t>Generating characters . . . Please wait</a:t>
-            </a:r>
-          </a:p>
-        </p:txBody>
-      </p:sp>
     </p:spTree>
     <p:extLst>
       <p:ext uri="{BB962C8B-B14F-4D97-AF65-F5344CB8AC3E}">

</xml_diff>

<commit_message>
Created seed page template
</commit_message>
<xml_diff>
--- a/Art/Logo/Logo.pptx
+++ b/Art/Logo/Logo.pptx
@@ -8,6 +8,7 @@
     <p:sldId id="261" r:id="rId2"/>
     <p:sldId id="259" r:id="rId3"/>
     <p:sldId id="260" r:id="rId4"/>
+    <p:sldId id="262" r:id="rId5"/>
   </p:sldIdLst>
   <p:sldSz cx="12192000" cy="6858000"/>
   <p:notesSz cx="6858000" cy="9144000"/>
@@ -261,7 +262,7 @@
           <a:p>
             <a:fld id="{7EC8CFAE-0421-2A41-9031-AE8080A47584}" type="datetimeFigureOut">
               <a:rPr lang="en-US" smtClean="0"/>
-              <a:t>11/11/19</a:t>
+              <a:t>11/12/19</a:t>
             </a:fld>
             <a:endParaRPr lang="en-US"/>
           </a:p>
@@ -459,7 +460,7 @@
           <a:p>
             <a:fld id="{7EC8CFAE-0421-2A41-9031-AE8080A47584}" type="datetimeFigureOut">
               <a:rPr lang="en-US" smtClean="0"/>
-              <a:t>11/11/19</a:t>
+              <a:t>11/12/19</a:t>
             </a:fld>
             <a:endParaRPr lang="en-US"/>
           </a:p>
@@ -667,7 +668,7 @@
           <a:p>
             <a:fld id="{7EC8CFAE-0421-2A41-9031-AE8080A47584}" type="datetimeFigureOut">
               <a:rPr lang="en-US" smtClean="0"/>
-              <a:t>11/11/19</a:t>
+              <a:t>11/12/19</a:t>
             </a:fld>
             <a:endParaRPr lang="en-US"/>
           </a:p>
@@ -865,7 +866,7 @@
           <a:p>
             <a:fld id="{7EC8CFAE-0421-2A41-9031-AE8080A47584}" type="datetimeFigureOut">
               <a:rPr lang="en-US" smtClean="0"/>
-              <a:t>11/11/19</a:t>
+              <a:t>11/12/19</a:t>
             </a:fld>
             <a:endParaRPr lang="en-US"/>
           </a:p>
@@ -1140,7 +1141,7 @@
           <a:p>
             <a:fld id="{7EC8CFAE-0421-2A41-9031-AE8080A47584}" type="datetimeFigureOut">
               <a:rPr lang="en-US" smtClean="0"/>
-              <a:t>11/11/19</a:t>
+              <a:t>11/12/19</a:t>
             </a:fld>
             <a:endParaRPr lang="en-US"/>
           </a:p>
@@ -1405,7 +1406,7 @@
           <a:p>
             <a:fld id="{7EC8CFAE-0421-2A41-9031-AE8080A47584}" type="datetimeFigureOut">
               <a:rPr lang="en-US" smtClean="0"/>
-              <a:t>11/11/19</a:t>
+              <a:t>11/12/19</a:t>
             </a:fld>
             <a:endParaRPr lang="en-US"/>
           </a:p>
@@ -1817,7 +1818,7 @@
           <a:p>
             <a:fld id="{7EC8CFAE-0421-2A41-9031-AE8080A47584}" type="datetimeFigureOut">
               <a:rPr lang="en-US" smtClean="0"/>
-              <a:t>11/11/19</a:t>
+              <a:t>11/12/19</a:t>
             </a:fld>
             <a:endParaRPr lang="en-US"/>
           </a:p>
@@ -1958,7 +1959,7 @@
           <a:p>
             <a:fld id="{7EC8CFAE-0421-2A41-9031-AE8080A47584}" type="datetimeFigureOut">
               <a:rPr lang="en-US" smtClean="0"/>
-              <a:t>11/11/19</a:t>
+              <a:t>11/12/19</a:t>
             </a:fld>
             <a:endParaRPr lang="en-US"/>
           </a:p>
@@ -2071,7 +2072,7 @@
           <a:p>
             <a:fld id="{7EC8CFAE-0421-2A41-9031-AE8080A47584}" type="datetimeFigureOut">
               <a:rPr lang="en-US" smtClean="0"/>
-              <a:t>11/11/19</a:t>
+              <a:t>11/12/19</a:t>
             </a:fld>
             <a:endParaRPr lang="en-US"/>
           </a:p>
@@ -2382,7 +2383,7 @@
           <a:p>
             <a:fld id="{7EC8CFAE-0421-2A41-9031-AE8080A47584}" type="datetimeFigureOut">
               <a:rPr lang="en-US" smtClean="0"/>
-              <a:t>11/11/19</a:t>
+              <a:t>11/12/19</a:t>
             </a:fld>
             <a:endParaRPr lang="en-US"/>
           </a:p>
@@ -2670,7 +2671,7 @@
           <a:p>
             <a:fld id="{7EC8CFAE-0421-2A41-9031-AE8080A47584}" type="datetimeFigureOut">
               <a:rPr lang="en-US" smtClean="0"/>
-              <a:t>11/11/19</a:t>
+              <a:t>11/12/19</a:t>
             </a:fld>
             <a:endParaRPr lang="en-US"/>
           </a:p>
@@ -2911,7 +2912,7 @@
           <a:p>
             <a:fld id="{7EC8CFAE-0421-2A41-9031-AE8080A47584}" type="datetimeFigureOut">
               <a:rPr lang="en-US" smtClean="0"/>
-              <a:t>11/11/19</a:t>
+              <a:t>11/12/19</a:t>
             </a:fld>
             <a:endParaRPr lang="en-US"/>
           </a:p>
@@ -4851,6 +4852,548 @@
 </p:sld>
 </file>
 
+<file path=ppt/slides/slide4.xml><?xml version="1.0" encoding="utf-8"?>
+<p:sld xmlns:a="http://schemas.openxmlformats.org/drawingml/2006/main" xmlns:r="http://schemas.openxmlformats.org/officeDocument/2006/relationships" xmlns:p="http://schemas.openxmlformats.org/presentationml/2006/main">
+  <p:cSld>
+    <p:spTree>
+      <p:nvGrpSpPr>
+        <p:cNvPr id="1" name=""/>
+        <p:cNvGrpSpPr/>
+        <p:nvPr/>
+      </p:nvGrpSpPr>
+      <p:grpSpPr>
+        <a:xfrm>
+          <a:off x="0" y="0"/>
+          <a:ext cx="0" cy="0"/>
+          <a:chOff x="0" y="0"/>
+          <a:chExt cx="0" cy="0"/>
+        </a:xfrm>
+      </p:grpSpPr>
+      <p:grpSp>
+        <p:nvGrpSpPr>
+          <p:cNvPr id="5" name="Group 4">
+            <a:extLst>
+              <a:ext uri="{FF2B5EF4-FFF2-40B4-BE49-F238E27FC236}">
+                <a16:creationId xmlns:a16="http://schemas.microsoft.com/office/drawing/2014/main" id="{B5D25FA4-9C2D-E642-8977-F9DB1BFAA748}"/>
+              </a:ext>
+            </a:extLst>
+          </p:cNvPr>
+          <p:cNvGrpSpPr/>
+          <p:nvPr/>
+        </p:nvGrpSpPr>
+        <p:grpSpPr>
+          <a:xfrm>
+            <a:off x="-876301" y="-31119"/>
+            <a:ext cx="13944601" cy="7137891"/>
+            <a:chOff x="-876301" y="-31119"/>
+            <a:chExt cx="13944601" cy="7137891"/>
+          </a:xfrm>
+        </p:grpSpPr>
+        <p:grpSp>
+          <p:nvGrpSpPr>
+            <p:cNvPr id="2" name="Group 1">
+              <a:extLst>
+                <a:ext uri="{FF2B5EF4-FFF2-40B4-BE49-F238E27FC236}">
+                  <a16:creationId xmlns:a16="http://schemas.microsoft.com/office/drawing/2014/main" id="{04A6CA2A-4CBD-1C4C-AE90-CF2CF23534CB}"/>
+                </a:ext>
+              </a:extLst>
+            </p:cNvPr>
+            <p:cNvGrpSpPr/>
+            <p:nvPr/>
+          </p:nvGrpSpPr>
+          <p:grpSpPr>
+            <a:xfrm>
+              <a:off x="-876301" y="-31119"/>
+              <a:ext cx="13944601" cy="7137891"/>
+              <a:chOff x="-876301" y="-31119"/>
+              <a:chExt cx="13944601" cy="7137891"/>
+            </a:xfrm>
+          </p:grpSpPr>
+          <p:sp>
+            <p:nvSpPr>
+              <p:cNvPr id="4" name="Rectangle 3">
+                <a:extLst>
+                  <a:ext uri="{FF2B5EF4-FFF2-40B4-BE49-F238E27FC236}">
+                    <a16:creationId xmlns:a16="http://schemas.microsoft.com/office/drawing/2014/main" id="{4063AAD3-E10F-3547-8177-B73D21CF5894}"/>
+                  </a:ext>
+                </a:extLst>
+              </p:cNvPr>
+              <p:cNvSpPr>
+                <a:spLocks/>
+              </p:cNvSpPr>
+              <p:nvPr/>
+            </p:nvSpPr>
+            <p:spPr>
+              <a:xfrm>
+                <a:off x="-876301" y="-31119"/>
+                <a:ext cx="13944601" cy="7137891"/>
+              </a:xfrm>
+              <a:prstGeom prst="rect">
+                <a:avLst/>
+              </a:prstGeom>
+              <a:solidFill>
+                <a:schemeClr val="tx1"/>
+              </a:solidFill>
+              <a:ln>
+                <a:noFill/>
+              </a:ln>
+            </p:spPr>
+            <p:style>
+              <a:lnRef idx="2">
+                <a:schemeClr val="accent1">
+                  <a:shade val="50000"/>
+                </a:schemeClr>
+              </a:lnRef>
+              <a:fillRef idx="1">
+                <a:schemeClr val="accent1"/>
+              </a:fillRef>
+              <a:effectRef idx="0">
+                <a:schemeClr val="accent1"/>
+              </a:effectRef>
+              <a:fontRef idx="minor">
+                <a:schemeClr val="lt1"/>
+              </a:fontRef>
+            </p:style>
+            <p:txBody>
+              <a:bodyPr rtlCol="0" anchor="ctr"/>
+              <a:lstStyle/>
+              <a:p>
+                <a:pPr algn="ctr"/>
+                <a:endParaRPr lang="en-US" dirty="0"/>
+              </a:p>
+            </p:txBody>
+          </p:sp>
+          <p:sp>
+            <p:nvSpPr>
+              <p:cNvPr id="9" name="Oval 8">
+                <a:extLst>
+                  <a:ext uri="{FF2B5EF4-FFF2-40B4-BE49-F238E27FC236}">
+                    <a16:creationId xmlns:a16="http://schemas.microsoft.com/office/drawing/2014/main" id="{65E9EB02-469B-D340-917A-E8E3AA6CA259}"/>
+                  </a:ext>
+                </a:extLst>
+              </p:cNvPr>
+              <p:cNvSpPr/>
+              <p:nvPr/>
+            </p:nvSpPr>
+            <p:spPr>
+              <a:xfrm>
+                <a:off x="4000500" y="440835"/>
+                <a:ext cx="2857500" cy="2873201"/>
+              </a:xfrm>
+              <a:prstGeom prst="ellipse">
+                <a:avLst/>
+              </a:prstGeom>
+              <a:solidFill>
+                <a:schemeClr val="accent4">
+                  <a:lumMod val="75000"/>
+                  <a:alpha val="49000"/>
+                </a:schemeClr>
+              </a:solidFill>
+              <a:ln>
+                <a:noFill/>
+              </a:ln>
+            </p:spPr>
+            <p:style>
+              <a:lnRef idx="2">
+                <a:schemeClr val="accent1">
+                  <a:shade val="50000"/>
+                </a:schemeClr>
+              </a:lnRef>
+              <a:fillRef idx="1">
+                <a:schemeClr val="accent1"/>
+              </a:fillRef>
+              <a:effectRef idx="0">
+                <a:schemeClr val="accent1"/>
+              </a:effectRef>
+              <a:fontRef idx="minor">
+                <a:schemeClr val="lt1"/>
+              </a:fontRef>
+            </p:style>
+            <p:txBody>
+              <a:bodyPr rtlCol="0" anchor="ctr"/>
+              <a:lstStyle/>
+              <a:p>
+                <a:pPr algn="ctr"/>
+                <a:endParaRPr lang="en-US" dirty="0"/>
+              </a:p>
+            </p:txBody>
+          </p:sp>
+          <p:sp>
+            <p:nvSpPr>
+              <p:cNvPr id="10" name="Oval 9">
+                <a:extLst>
+                  <a:ext uri="{FF2B5EF4-FFF2-40B4-BE49-F238E27FC236}">
+                    <a16:creationId xmlns:a16="http://schemas.microsoft.com/office/drawing/2014/main" id="{8BA33C70-0155-E84F-845F-ABB69789D9E8}"/>
+                  </a:ext>
+                </a:extLst>
+              </p:cNvPr>
+              <p:cNvSpPr/>
+              <p:nvPr/>
+            </p:nvSpPr>
+            <p:spPr>
+              <a:xfrm>
+                <a:off x="4329113" y="785636"/>
+                <a:ext cx="2214562" cy="2226731"/>
+              </a:xfrm>
+              <a:prstGeom prst="ellipse">
+                <a:avLst/>
+              </a:prstGeom>
+              <a:solidFill>
+                <a:schemeClr val="tx1"/>
+              </a:solidFill>
+              <a:ln>
+                <a:noFill/>
+              </a:ln>
+            </p:spPr>
+            <p:style>
+              <a:lnRef idx="2">
+                <a:schemeClr val="accent1">
+                  <a:shade val="50000"/>
+                </a:schemeClr>
+              </a:lnRef>
+              <a:fillRef idx="1">
+                <a:schemeClr val="accent1"/>
+              </a:fillRef>
+              <a:effectRef idx="0">
+                <a:schemeClr val="accent1"/>
+              </a:effectRef>
+              <a:fontRef idx="minor">
+                <a:schemeClr val="lt1"/>
+              </a:fontRef>
+            </p:style>
+            <p:txBody>
+              <a:bodyPr rtlCol="0" anchor="ctr"/>
+              <a:lstStyle/>
+              <a:p>
+                <a:pPr algn="ctr"/>
+                <a:endParaRPr lang="en-US" dirty="0"/>
+              </a:p>
+            </p:txBody>
+          </p:sp>
+          <p:sp>
+            <p:nvSpPr>
+              <p:cNvPr id="11" name="Freeform 10">
+                <a:extLst>
+                  <a:ext uri="{FF2B5EF4-FFF2-40B4-BE49-F238E27FC236}">
+                    <a16:creationId xmlns:a16="http://schemas.microsoft.com/office/drawing/2014/main" id="{D9474D3A-40BB-A44E-AA0D-88865263A5DD}"/>
+                  </a:ext>
+                </a:extLst>
+              </p:cNvPr>
+              <p:cNvSpPr/>
+              <p:nvPr/>
+            </p:nvSpPr>
+            <p:spPr>
+              <a:xfrm>
+                <a:off x="6129112" y="2850537"/>
+                <a:ext cx="2086077" cy="2149692"/>
+              </a:xfrm>
+              <a:custGeom>
+                <a:avLst/>
+                <a:gdLst>
+                  <a:gd name="connsiteX0" fmla="*/ 226 w 2086077"/>
+                  <a:gd name="connsiteY0" fmla="*/ 688648 h 2149692"/>
+                  <a:gd name="connsiteX1" fmla="*/ 614588 w 2086077"/>
+                  <a:gd name="connsiteY1" fmla="*/ 17135 h 2149692"/>
+                  <a:gd name="connsiteX2" fmla="*/ 828901 w 2086077"/>
+                  <a:gd name="connsiteY2" fmla="*/ 288598 h 2149692"/>
+                  <a:gd name="connsiteX3" fmla="*/ 1986188 w 2086077"/>
+                  <a:gd name="connsiteY3" fmla="*/ 1231573 h 2149692"/>
+                  <a:gd name="connsiteX4" fmla="*/ 1986188 w 2086077"/>
+                  <a:gd name="connsiteY4" fmla="*/ 1988810 h 2149692"/>
+                  <a:gd name="connsiteX5" fmla="*/ 1643288 w 2086077"/>
+                  <a:gd name="connsiteY5" fmla="*/ 2031673 h 2149692"/>
+                  <a:gd name="connsiteX6" fmla="*/ 557438 w 2086077"/>
+                  <a:gd name="connsiteY6" fmla="*/ 674360 h 2149692"/>
+                  <a:gd name="connsiteX7" fmla="*/ 226 w 2086077"/>
+                  <a:gd name="connsiteY7" fmla="*/ 688648 h 2149692"/>
+                </a:gdLst>
+                <a:ahLst/>
+                <a:cxnLst>
+                  <a:cxn ang="0">
+                    <a:pos x="connsiteX0" y="connsiteY0"/>
+                  </a:cxn>
+                  <a:cxn ang="0">
+                    <a:pos x="connsiteX1" y="connsiteY1"/>
+                  </a:cxn>
+                  <a:cxn ang="0">
+                    <a:pos x="connsiteX2" y="connsiteY2"/>
+                  </a:cxn>
+                  <a:cxn ang="0">
+                    <a:pos x="connsiteX3" y="connsiteY3"/>
+                  </a:cxn>
+                  <a:cxn ang="0">
+                    <a:pos x="connsiteX4" y="connsiteY4"/>
+                  </a:cxn>
+                  <a:cxn ang="0">
+                    <a:pos x="connsiteX5" y="connsiteY5"/>
+                  </a:cxn>
+                  <a:cxn ang="0">
+                    <a:pos x="connsiteX6" y="connsiteY6"/>
+                  </a:cxn>
+                  <a:cxn ang="0">
+                    <a:pos x="connsiteX7" y="connsiteY7"/>
+                  </a:cxn>
+                </a:cxnLst>
+                <a:rect l="l" t="t" r="r" b="b"/>
+                <a:pathLst>
+                  <a:path w="2086077" h="2149692">
+                    <a:moveTo>
+                      <a:pt x="226" y="688648"/>
+                    </a:moveTo>
+                    <a:cubicBezTo>
+                      <a:pt x="9751" y="579111"/>
+                      <a:pt x="476475" y="83810"/>
+                      <a:pt x="614588" y="17135"/>
+                    </a:cubicBezTo>
+                    <a:cubicBezTo>
+                      <a:pt x="752701" y="-49540"/>
+                      <a:pt x="600301" y="86192"/>
+                      <a:pt x="828901" y="288598"/>
+                    </a:cubicBezTo>
+                    <a:cubicBezTo>
+                      <a:pt x="1057501" y="491004"/>
+                      <a:pt x="1793307" y="948204"/>
+                      <a:pt x="1986188" y="1231573"/>
+                    </a:cubicBezTo>
+                    <a:cubicBezTo>
+                      <a:pt x="2179069" y="1514942"/>
+                      <a:pt x="2043338" y="1855460"/>
+                      <a:pt x="1986188" y="1988810"/>
+                    </a:cubicBezTo>
+                    <a:cubicBezTo>
+                      <a:pt x="1929038" y="2122160"/>
+                      <a:pt x="1881413" y="2250748"/>
+                      <a:pt x="1643288" y="2031673"/>
+                    </a:cubicBezTo>
+                    <a:cubicBezTo>
+                      <a:pt x="1405163" y="1812598"/>
+                      <a:pt x="831282" y="893435"/>
+                      <a:pt x="557438" y="674360"/>
+                    </a:cubicBezTo>
+                    <a:cubicBezTo>
+                      <a:pt x="283594" y="455285"/>
+                      <a:pt x="-9299" y="798185"/>
+                      <a:pt x="226" y="688648"/>
+                    </a:cubicBezTo>
+                    <a:close/>
+                  </a:path>
+                </a:pathLst>
+              </a:custGeom>
+              <a:solidFill>
+                <a:schemeClr val="accent4">
+                  <a:lumMod val="75000"/>
+                  <a:alpha val="49000"/>
+                </a:schemeClr>
+              </a:solidFill>
+              <a:ln>
+                <a:noFill/>
+              </a:ln>
+            </p:spPr>
+            <p:style>
+              <a:lnRef idx="2">
+                <a:schemeClr val="accent1">
+                  <a:shade val="50000"/>
+                </a:schemeClr>
+              </a:lnRef>
+              <a:fillRef idx="1">
+                <a:schemeClr val="accent1"/>
+              </a:fillRef>
+              <a:effectRef idx="0">
+                <a:schemeClr val="accent1"/>
+              </a:effectRef>
+              <a:fontRef idx="minor">
+                <a:schemeClr val="lt1"/>
+              </a:fontRef>
+            </p:style>
+            <p:txBody>
+              <a:bodyPr rtlCol="0" anchor="ctr"/>
+              <a:lstStyle/>
+              <a:p>
+                <a:pPr algn="ctr"/>
+                <a:endParaRPr lang="en-US" dirty="0"/>
+              </a:p>
+            </p:txBody>
+          </p:sp>
+          <p:sp>
+            <p:nvSpPr>
+              <p:cNvPr id="12" name="TextBox 11">
+                <a:extLst>
+                  <a:ext uri="{FF2B5EF4-FFF2-40B4-BE49-F238E27FC236}">
+                    <a16:creationId xmlns:a16="http://schemas.microsoft.com/office/drawing/2014/main" id="{807E4626-E821-7746-9F3A-1C3358DDC491}"/>
+                  </a:ext>
+                </a:extLst>
+              </p:cNvPr>
+              <p:cNvSpPr txBox="1"/>
+              <p:nvPr/>
+            </p:nvSpPr>
+            <p:spPr>
+              <a:xfrm>
+                <a:off x="0" y="1311279"/>
+                <a:ext cx="12192000" cy="2862322"/>
+              </a:xfrm>
+              <a:prstGeom prst="rect">
+                <a:avLst/>
+              </a:prstGeom>
+              <a:noFill/>
+            </p:spPr>
+            <p:txBody>
+              <a:bodyPr wrap="square" rtlCol="0">
+                <a:spAutoFit/>
+              </a:bodyPr>
+              <a:lstStyle/>
+              <a:p>
+                <a:pPr algn="ctr"/>
+                <a:r>
+                  <a:rPr lang="en-US" sz="17500" b="1" spc="200" dirty="0">
+                    <a:solidFill>
+                      <a:srgbClr val="C00000"/>
+                    </a:solidFill>
+                    <a:effectLst>
+                      <a:outerShdw blurRad="50800" dist="38100" dir="18900000" sx="101000" sy="101000" algn="bl" rotWithShape="0">
+                        <a:prstClr val="black"/>
+                      </a:outerShdw>
+                    </a:effectLst>
+                    <a:latin typeface="Bahiana" pitchFamily="2" charset="77"/>
+                  </a:rPr>
+                  <a:t>Merder Misstery</a:t>
+                </a:r>
+              </a:p>
+            </p:txBody>
+          </p:sp>
+        </p:grpSp>
+        <p:sp>
+          <p:nvSpPr>
+            <p:cNvPr id="3" name="TextBox 2">
+              <a:extLst>
+                <a:ext uri="{FF2B5EF4-FFF2-40B4-BE49-F238E27FC236}">
+                  <a16:creationId xmlns:a16="http://schemas.microsoft.com/office/drawing/2014/main" id="{9E1B1324-333A-F642-AACA-3FAB0865B8E6}"/>
+                </a:ext>
+              </a:extLst>
+            </p:cNvPr>
+            <p:cNvSpPr txBox="1"/>
+            <p:nvPr/>
+          </p:nvSpPr>
+          <p:spPr>
+            <a:xfrm>
+              <a:off x="-819150" y="5076326"/>
+              <a:ext cx="13887450" cy="584775"/>
+            </a:xfrm>
+            <a:prstGeom prst="rect">
+              <a:avLst/>
+            </a:prstGeom>
+            <a:noFill/>
+          </p:spPr>
+          <p:txBody>
+            <a:bodyPr wrap="square" rtlCol="0">
+              <a:spAutoFit/>
+            </a:bodyPr>
+            <a:lstStyle/>
+            <a:p>
+              <a:pPr algn="ctr"/>
+              <a:r>
+                <a:rPr lang="en-US" sz="3200" dirty="0">
+                  <a:solidFill>
+                    <a:schemeClr val="accent3"/>
+                  </a:solidFill>
+                  <a:latin typeface="Bahiana" pitchFamily="2" charset="77"/>
+                </a:rPr>
+                <a:t>Type/paste generation seed and press enter (leave blank to solve a new </a:t>
+              </a:r>
+              <a:r>
+                <a:rPr lang="en-US" sz="3200" dirty="0" err="1">
+                  <a:solidFill>
+                    <a:schemeClr val="accent3"/>
+                  </a:solidFill>
+                  <a:latin typeface="Bahiana" pitchFamily="2" charset="77"/>
+                </a:rPr>
+                <a:t>misstery</a:t>
+              </a:r>
+              <a:r>
+                <a:rPr lang="en-US" sz="3200" dirty="0">
+                  <a:solidFill>
+                    <a:schemeClr val="accent3"/>
+                  </a:solidFill>
+                  <a:latin typeface="Bahiana" pitchFamily="2" charset="77"/>
+                </a:rPr>
+                <a:t>)</a:t>
+              </a:r>
+            </a:p>
+          </p:txBody>
+        </p:sp>
+        <p:sp>
+          <p:nvSpPr>
+            <p:cNvPr id="13" name="Rounded Rectangle 12">
+              <a:extLst>
+                <a:ext uri="{FF2B5EF4-FFF2-40B4-BE49-F238E27FC236}">
+                  <a16:creationId xmlns:a16="http://schemas.microsoft.com/office/drawing/2014/main" id="{8950FBF6-7783-134C-A266-F492D6FBC77E}"/>
+                </a:ext>
+              </a:extLst>
+            </p:cNvPr>
+            <p:cNvSpPr/>
+            <p:nvPr/>
+          </p:nvSpPr>
+          <p:spPr>
+            <a:xfrm>
+              <a:off x="1553763" y="5718451"/>
+              <a:ext cx="9147575" cy="845375"/>
+            </a:xfrm>
+            <a:prstGeom prst="roundRect">
+              <a:avLst/>
+            </a:prstGeom>
+            <a:solidFill>
+              <a:schemeClr val="accent4">
+                <a:lumMod val="75000"/>
+                <a:alpha val="49000"/>
+              </a:schemeClr>
+            </a:solidFill>
+            <a:ln>
+              <a:noFill/>
+            </a:ln>
+          </p:spPr>
+          <p:style>
+            <a:lnRef idx="2">
+              <a:schemeClr val="accent1">
+                <a:shade val="50000"/>
+              </a:schemeClr>
+            </a:lnRef>
+            <a:fillRef idx="1">
+              <a:schemeClr val="accent1"/>
+            </a:fillRef>
+            <a:effectRef idx="0">
+              <a:schemeClr val="accent1"/>
+            </a:effectRef>
+            <a:fontRef idx="minor">
+              <a:schemeClr val="lt1"/>
+            </a:fontRef>
+          </p:style>
+          <p:txBody>
+            <a:bodyPr rtlCol="0" anchor="ctr"/>
+            <a:lstStyle/>
+            <a:p>
+              <a:pPr algn="ctr"/>
+              <a:endParaRPr lang="en-US" sz="4600" dirty="0">
+                <a:solidFill>
+                  <a:schemeClr val="accent3"/>
+                </a:solidFill>
+                <a:latin typeface="Bahiana" pitchFamily="2" charset="77"/>
+              </a:endParaRPr>
+            </a:p>
+          </p:txBody>
+        </p:sp>
+      </p:grpSp>
+    </p:spTree>
+    <p:extLst>
+      <p:ext uri="{BB962C8B-B14F-4D97-AF65-F5344CB8AC3E}">
+        <p14:creationId xmlns:p14="http://schemas.microsoft.com/office/powerpoint/2010/main" val="3134520517"/>
+      </p:ext>
+    </p:extLst>
+  </p:cSld>
+  <p:clrMapOvr>
+    <a:masterClrMapping/>
+  </p:clrMapOvr>
+</p:sld>
+</file>
+
 <file path=ppt/theme/theme1.xml><?xml version="1.0" encoding="utf-8"?>
 <a:theme xmlns:a="http://schemas.openxmlformats.org/drawingml/2006/main" name="Office Theme">
   <a:themeElements>

</xml_diff>